<commit_message>
Updated Cap 1 and 2
</commit_message>
<xml_diff>
--- a/Churn_Analysis/Churn_Analysis_Presentation.pptx
+++ b/Churn_Analysis/Churn_Analysis_Presentation.pptx
@@ -2,8 +2,11 @@
 <file path=ppt/presentation.xml><?xml version="1.0" encoding="utf-8"?>
 <p:presentation xmlns:a="http://schemas.openxmlformats.org/drawingml/2006/main" xmlns:r="http://schemas.openxmlformats.org/officeDocument/2006/relationships" xmlns:p="http://schemas.openxmlformats.org/presentationml/2006/main" saveSubsetFonts="1">
   <p:sldMasterIdLst>
-    <p:sldMasterId id="2147483648" r:id="rId1"/>
+    <p:sldMasterId id="2147483684" r:id="rId1"/>
   </p:sldMasterIdLst>
+  <p:notesMasterIdLst>
+    <p:notesMasterId r:id="rId25"/>
+  </p:notesMasterIdLst>
   <p:sldIdLst>
     <p:sldId id="256" r:id="rId2"/>
     <p:sldId id="257" r:id="rId3"/>
@@ -11,14 +14,25 @@
     <p:sldId id="259" r:id="rId5"/>
     <p:sldId id="260" r:id="rId6"/>
     <p:sldId id="261" r:id="rId7"/>
-    <p:sldId id="262" r:id="rId8"/>
-    <p:sldId id="263" r:id="rId9"/>
+    <p:sldId id="275" r:id="rId8"/>
+    <p:sldId id="262" r:id="rId9"/>
     <p:sldId id="264" r:id="rId10"/>
     <p:sldId id="265" r:id="rId11"/>
     <p:sldId id="266" r:id="rId12"/>
     <p:sldId id="267" r:id="rId13"/>
+    <p:sldId id="268" r:id="rId14"/>
+    <p:sldId id="269" r:id="rId15"/>
+    <p:sldId id="270" r:id="rId16"/>
+    <p:sldId id="271" r:id="rId17"/>
+    <p:sldId id="272" r:id="rId18"/>
+    <p:sldId id="273" r:id="rId19"/>
+    <p:sldId id="274" r:id="rId20"/>
+    <p:sldId id="276" r:id="rId21"/>
+    <p:sldId id="277" r:id="rId22"/>
+    <p:sldId id="278" r:id="rId23"/>
+    <p:sldId id="279" r:id="rId24"/>
   </p:sldIdLst>
-  <p:sldSz cx="9144000" cy="6858000" type="screen4x3"/>
+  <p:sldSz cx="9144000" cy="5143500" type="screen16x9"/>
   <p:notesSz cx="6858000" cy="9144000"/>
   <p:defaultTextStyle>
     <a:defPPr>
@@ -118,6 +132,356 @@
 </p:presentation>
 </file>
 
+<file path=ppt/notesMasters/notesMaster1.xml><?xml version="1.0" encoding="utf-8"?>
+<p:notesMaster xmlns:a="http://schemas.openxmlformats.org/drawingml/2006/main" xmlns:r="http://schemas.openxmlformats.org/officeDocument/2006/relationships" xmlns:p="http://schemas.openxmlformats.org/presentationml/2006/main">
+  <p:cSld>
+    <p:bg>
+      <p:bgRef idx="1001">
+        <a:schemeClr val="bg1"/>
+      </p:bgRef>
+    </p:bg>
+    <p:spTree>
+      <p:nvGrpSpPr>
+        <p:cNvPr id="1" name=""/>
+        <p:cNvGrpSpPr/>
+        <p:nvPr/>
+      </p:nvGrpSpPr>
+      <p:grpSpPr>
+        <a:xfrm>
+          <a:off x="0" y="0"/>
+          <a:ext cx="0" cy="0"/>
+          <a:chOff x="0" y="0"/>
+          <a:chExt cx="0" cy="0"/>
+        </a:xfrm>
+      </p:grpSpPr>
+      <p:sp>
+        <p:nvSpPr>
+          <p:cNvPr id="2" name="Header Placeholder 1"/>
+          <p:cNvSpPr>
+            <a:spLocks noGrp="1"/>
+          </p:cNvSpPr>
+          <p:nvPr>
+            <p:ph type="hdr" sz="quarter"/>
+          </p:nvPr>
+        </p:nvSpPr>
+        <p:spPr>
+          <a:xfrm>
+            <a:off x="0" y="0"/>
+            <a:ext cx="2971800" cy="457200"/>
+          </a:xfrm>
+          <a:prstGeom prst="rect">
+            <a:avLst/>
+          </a:prstGeom>
+        </p:spPr>
+        <p:txBody>
+          <a:bodyPr vert="horz" lIns="91440" tIns="45720" rIns="91440" bIns="45720" rtlCol="0"/>
+          <a:lstStyle>
+            <a:lvl1pPr algn="l">
+              <a:defRPr sz="1200"/>
+            </a:lvl1pPr>
+          </a:lstStyle>
+          <a:p>
+            <a:endParaRPr lang="en-IN"/>
+          </a:p>
+        </p:txBody>
+      </p:sp>
+      <p:sp>
+        <p:nvSpPr>
+          <p:cNvPr id="3" name="Date Placeholder 2"/>
+          <p:cNvSpPr>
+            <a:spLocks noGrp="1"/>
+          </p:cNvSpPr>
+          <p:nvPr>
+            <p:ph type="dt" idx="1"/>
+          </p:nvPr>
+        </p:nvSpPr>
+        <p:spPr>
+          <a:xfrm>
+            <a:off x="3884613" y="0"/>
+            <a:ext cx="2971800" cy="457200"/>
+          </a:xfrm>
+          <a:prstGeom prst="rect">
+            <a:avLst/>
+          </a:prstGeom>
+        </p:spPr>
+        <p:txBody>
+          <a:bodyPr vert="horz" lIns="91440" tIns="45720" rIns="91440" bIns="45720" rtlCol="0"/>
+          <a:lstStyle>
+            <a:lvl1pPr algn="r">
+              <a:defRPr sz="1200"/>
+            </a:lvl1pPr>
+          </a:lstStyle>
+          <a:p>
+            <a:fld id="{CA9574FB-9513-44D2-95FE-872DA37971B9}" type="datetimeFigureOut">
+              <a:rPr lang="en-IN" smtClean="0"/>
+              <a:t>03-01-2020</a:t>
+            </a:fld>
+            <a:endParaRPr lang="en-IN"/>
+          </a:p>
+        </p:txBody>
+      </p:sp>
+      <p:sp>
+        <p:nvSpPr>
+          <p:cNvPr id="4" name="Slide Image Placeholder 3"/>
+          <p:cNvSpPr>
+            <a:spLocks noGrp="1" noRot="1" noChangeAspect="1"/>
+          </p:cNvSpPr>
+          <p:nvPr>
+            <p:ph type="sldImg" idx="2"/>
+          </p:nvPr>
+        </p:nvSpPr>
+        <p:spPr>
+          <a:xfrm>
+            <a:off x="381000" y="685800"/>
+            <a:ext cx="6096000" cy="3429000"/>
+          </a:xfrm>
+          <a:prstGeom prst="rect">
+            <a:avLst/>
+          </a:prstGeom>
+          <a:noFill/>
+          <a:ln w="12700">
+            <a:solidFill>
+              <a:prstClr val="black"/>
+            </a:solidFill>
+          </a:ln>
+        </p:spPr>
+        <p:txBody>
+          <a:bodyPr vert="horz" lIns="91440" tIns="45720" rIns="91440" bIns="45720" rtlCol="0" anchor="ctr"/>
+          <a:lstStyle/>
+          <a:p>
+            <a:endParaRPr lang="en-IN"/>
+          </a:p>
+        </p:txBody>
+      </p:sp>
+      <p:sp>
+        <p:nvSpPr>
+          <p:cNvPr id="5" name="Notes Placeholder 4"/>
+          <p:cNvSpPr>
+            <a:spLocks noGrp="1"/>
+          </p:cNvSpPr>
+          <p:nvPr>
+            <p:ph type="body" sz="quarter" idx="3"/>
+          </p:nvPr>
+        </p:nvSpPr>
+        <p:spPr>
+          <a:xfrm>
+            <a:off x="685800" y="4343400"/>
+            <a:ext cx="5486400" cy="4114800"/>
+          </a:xfrm>
+          <a:prstGeom prst="rect">
+            <a:avLst/>
+          </a:prstGeom>
+        </p:spPr>
+        <p:txBody>
+          <a:bodyPr vert="horz" lIns="91440" tIns="45720" rIns="91440" bIns="45720" rtlCol="0"/>
+          <a:lstStyle/>
+          <a:p>
+            <a:pPr lvl="0"/>
+            <a:r>
+              <a:rPr lang="en-US" smtClean="0"/>
+              <a:t>Click to edit Master text styles</a:t>
+            </a:r>
+          </a:p>
+          <a:p>
+            <a:pPr lvl="1"/>
+            <a:r>
+              <a:rPr lang="en-US" smtClean="0"/>
+              <a:t>Second level</a:t>
+            </a:r>
+          </a:p>
+          <a:p>
+            <a:pPr lvl="2"/>
+            <a:r>
+              <a:rPr lang="en-US" smtClean="0"/>
+              <a:t>Third level</a:t>
+            </a:r>
+          </a:p>
+          <a:p>
+            <a:pPr lvl="3"/>
+            <a:r>
+              <a:rPr lang="en-US" smtClean="0"/>
+              <a:t>Fourth level</a:t>
+            </a:r>
+          </a:p>
+          <a:p>
+            <a:pPr lvl="4"/>
+            <a:r>
+              <a:rPr lang="en-US" smtClean="0"/>
+              <a:t>Fifth level</a:t>
+            </a:r>
+            <a:endParaRPr lang="en-IN"/>
+          </a:p>
+        </p:txBody>
+      </p:sp>
+      <p:sp>
+        <p:nvSpPr>
+          <p:cNvPr id="6" name="Footer Placeholder 5"/>
+          <p:cNvSpPr>
+            <a:spLocks noGrp="1"/>
+          </p:cNvSpPr>
+          <p:nvPr>
+            <p:ph type="ftr" sz="quarter" idx="4"/>
+          </p:nvPr>
+        </p:nvSpPr>
+        <p:spPr>
+          <a:xfrm>
+            <a:off x="0" y="8685213"/>
+            <a:ext cx="2971800" cy="457200"/>
+          </a:xfrm>
+          <a:prstGeom prst="rect">
+            <a:avLst/>
+          </a:prstGeom>
+        </p:spPr>
+        <p:txBody>
+          <a:bodyPr vert="horz" lIns="91440" tIns="45720" rIns="91440" bIns="45720" rtlCol="0" anchor="b"/>
+          <a:lstStyle>
+            <a:lvl1pPr algn="l">
+              <a:defRPr sz="1200"/>
+            </a:lvl1pPr>
+          </a:lstStyle>
+          <a:p>
+            <a:endParaRPr lang="en-IN"/>
+          </a:p>
+        </p:txBody>
+      </p:sp>
+      <p:sp>
+        <p:nvSpPr>
+          <p:cNvPr id="7" name="Slide Number Placeholder 6"/>
+          <p:cNvSpPr>
+            <a:spLocks noGrp="1"/>
+          </p:cNvSpPr>
+          <p:nvPr>
+            <p:ph type="sldNum" sz="quarter" idx="5"/>
+          </p:nvPr>
+        </p:nvSpPr>
+        <p:spPr>
+          <a:xfrm>
+            <a:off x="3884613" y="8685213"/>
+            <a:ext cx="2971800" cy="457200"/>
+          </a:xfrm>
+          <a:prstGeom prst="rect">
+            <a:avLst/>
+          </a:prstGeom>
+        </p:spPr>
+        <p:txBody>
+          <a:bodyPr vert="horz" lIns="91440" tIns="45720" rIns="91440" bIns="45720" rtlCol="0" anchor="b"/>
+          <a:lstStyle>
+            <a:lvl1pPr algn="r">
+              <a:defRPr sz="1200"/>
+            </a:lvl1pPr>
+          </a:lstStyle>
+          <a:p>
+            <a:fld id="{D29F3473-AD36-410D-B41F-1128AE6FC17C}" type="slidenum">
+              <a:rPr lang="en-IN" smtClean="0"/>
+              <a:t>‹#›</a:t>
+            </a:fld>
+            <a:endParaRPr lang="en-IN"/>
+          </a:p>
+        </p:txBody>
+      </p:sp>
+    </p:spTree>
+    <p:extLst>
+      <p:ext uri="{BB962C8B-B14F-4D97-AF65-F5344CB8AC3E}">
+        <p14:creationId xmlns:p14="http://schemas.microsoft.com/office/powerpoint/2010/main" val="1957165339"/>
+      </p:ext>
+    </p:extLst>
+  </p:cSld>
+  <p:clrMap bg1="lt1" tx1="dk1" bg2="lt2" tx2="dk2" accent1="accent1" accent2="accent2" accent3="accent3" accent4="accent4" accent5="accent5" accent6="accent6" hlink="hlink" folHlink="folHlink"/>
+  <p:notesStyle>
+    <a:lvl1pPr marL="0" algn="l" defTabSz="914400" rtl="0" eaLnBrk="1" latinLnBrk="0" hangingPunct="1">
+      <a:defRPr sz="1200" kern="1200">
+        <a:solidFill>
+          <a:schemeClr val="tx1"/>
+        </a:solidFill>
+        <a:latin typeface="+mn-lt"/>
+        <a:ea typeface="+mn-ea"/>
+        <a:cs typeface="+mn-cs"/>
+      </a:defRPr>
+    </a:lvl1pPr>
+    <a:lvl2pPr marL="457200" algn="l" defTabSz="914400" rtl="0" eaLnBrk="1" latinLnBrk="0" hangingPunct="1">
+      <a:defRPr sz="1200" kern="1200">
+        <a:solidFill>
+          <a:schemeClr val="tx1"/>
+        </a:solidFill>
+        <a:latin typeface="+mn-lt"/>
+        <a:ea typeface="+mn-ea"/>
+        <a:cs typeface="+mn-cs"/>
+      </a:defRPr>
+    </a:lvl2pPr>
+    <a:lvl3pPr marL="914400" algn="l" defTabSz="914400" rtl="0" eaLnBrk="1" latinLnBrk="0" hangingPunct="1">
+      <a:defRPr sz="1200" kern="1200">
+        <a:solidFill>
+          <a:schemeClr val="tx1"/>
+        </a:solidFill>
+        <a:latin typeface="+mn-lt"/>
+        <a:ea typeface="+mn-ea"/>
+        <a:cs typeface="+mn-cs"/>
+      </a:defRPr>
+    </a:lvl3pPr>
+    <a:lvl4pPr marL="1371600" algn="l" defTabSz="914400" rtl="0" eaLnBrk="1" latinLnBrk="0" hangingPunct="1">
+      <a:defRPr sz="1200" kern="1200">
+        <a:solidFill>
+          <a:schemeClr val="tx1"/>
+        </a:solidFill>
+        <a:latin typeface="+mn-lt"/>
+        <a:ea typeface="+mn-ea"/>
+        <a:cs typeface="+mn-cs"/>
+      </a:defRPr>
+    </a:lvl4pPr>
+    <a:lvl5pPr marL="1828800" algn="l" defTabSz="914400" rtl="0" eaLnBrk="1" latinLnBrk="0" hangingPunct="1">
+      <a:defRPr sz="1200" kern="1200">
+        <a:solidFill>
+          <a:schemeClr val="tx1"/>
+        </a:solidFill>
+        <a:latin typeface="+mn-lt"/>
+        <a:ea typeface="+mn-ea"/>
+        <a:cs typeface="+mn-cs"/>
+      </a:defRPr>
+    </a:lvl5pPr>
+    <a:lvl6pPr marL="2286000" algn="l" defTabSz="914400" rtl="0" eaLnBrk="1" latinLnBrk="0" hangingPunct="1">
+      <a:defRPr sz="1200" kern="1200">
+        <a:solidFill>
+          <a:schemeClr val="tx1"/>
+        </a:solidFill>
+        <a:latin typeface="+mn-lt"/>
+        <a:ea typeface="+mn-ea"/>
+        <a:cs typeface="+mn-cs"/>
+      </a:defRPr>
+    </a:lvl6pPr>
+    <a:lvl7pPr marL="2743200" algn="l" defTabSz="914400" rtl="0" eaLnBrk="1" latinLnBrk="0" hangingPunct="1">
+      <a:defRPr sz="1200" kern="1200">
+        <a:solidFill>
+          <a:schemeClr val="tx1"/>
+        </a:solidFill>
+        <a:latin typeface="+mn-lt"/>
+        <a:ea typeface="+mn-ea"/>
+        <a:cs typeface="+mn-cs"/>
+      </a:defRPr>
+    </a:lvl7pPr>
+    <a:lvl8pPr marL="3200400" algn="l" defTabSz="914400" rtl="0" eaLnBrk="1" latinLnBrk="0" hangingPunct="1">
+      <a:defRPr sz="1200" kern="1200">
+        <a:solidFill>
+          <a:schemeClr val="tx1"/>
+        </a:solidFill>
+        <a:latin typeface="+mn-lt"/>
+        <a:ea typeface="+mn-ea"/>
+        <a:cs typeface="+mn-cs"/>
+      </a:defRPr>
+    </a:lvl8pPr>
+    <a:lvl9pPr marL="3657600" algn="l" defTabSz="914400" rtl="0" eaLnBrk="1" latinLnBrk="0" hangingPunct="1">
+      <a:defRPr sz="1200" kern="1200">
+        <a:solidFill>
+          <a:schemeClr val="tx1"/>
+        </a:solidFill>
+        <a:latin typeface="+mn-lt"/>
+        <a:ea typeface="+mn-ea"/>
+        <a:cs typeface="+mn-cs"/>
+      </a:defRPr>
+    </a:lvl9pPr>
+  </p:notesStyle>
+</p:notesMaster>
+</file>
+
 <file path=ppt/slideLayouts/slideLayout1.xml><?xml version="1.0" encoding="utf-8"?>
 <p:sldLayout xmlns:a="http://schemas.openxmlformats.org/drawingml/2006/main" xmlns:r="http://schemas.openxmlformats.org/officeDocument/2006/relationships" xmlns:p="http://schemas.openxmlformats.org/presentationml/2006/main" type="title" preserve="1">
   <p:cSld name="Title Slide">
@@ -147,8 +511,8 @@
         </p:nvSpPr>
         <p:spPr>
           <a:xfrm>
-            <a:off x="685800" y="2130425"/>
-            <a:ext cx="7772400" cy="1470025"/>
+            <a:off x="685800" y="1597820"/>
+            <a:ext cx="7772400" cy="1102519"/>
           </a:xfrm>
         </p:spPr>
         <p:txBody>
@@ -159,7 +523,7 @@
               <a:rPr lang="en-US" smtClean="0"/>
               <a:t>Click to edit Master title style</a:t>
             </a:r>
-            <a:endParaRPr lang="en-US"/>
+            <a:endParaRPr lang="en-IN"/>
           </a:p>
         </p:txBody>
       </p:sp>
@@ -175,8 +539,8 @@
         </p:nvSpPr>
         <p:spPr>
           <a:xfrm>
-            <a:off x="1371600" y="3886200"/>
-            <a:ext cx="6400800" cy="1752600"/>
+            <a:off x="1371600" y="2914650"/>
+            <a:ext cx="6400800" cy="1314450"/>
           </a:xfrm>
         </p:spPr>
         <p:txBody>
@@ -278,7 +642,7 @@
               <a:rPr lang="en-US" smtClean="0"/>
               <a:t>Click to edit Master subtitle style</a:t>
             </a:r>
-            <a:endParaRPr lang="en-US"/>
+            <a:endParaRPr lang="en-IN"/>
           </a:p>
         </p:txBody>
       </p:sp>
@@ -300,7 +664,7 @@
             <a:fld id="{1D8BD707-D9CF-40AE-B4C6-C98DA3205C09}" type="datetimeFigureOut">
               <a:rPr lang="en-US" smtClean="0"/>
               <a:pPr/>
-              <a:t>10/12/2019</a:t>
+              <a:t>1/3/2020</a:t>
             </a:fld>
             <a:endParaRPr lang="en-US"/>
           </a:p>
@@ -350,6 +714,11 @@
         </p:txBody>
       </p:sp>
     </p:spTree>
+    <p:extLst>
+      <p:ext uri="{BB962C8B-B14F-4D97-AF65-F5344CB8AC3E}">
+        <p14:creationId xmlns:p14="http://schemas.microsoft.com/office/powerpoint/2010/main" val="3091671346"/>
+      </p:ext>
+    </p:extLst>
   </p:cSld>
   <p:clrMapOvr>
     <a:masterClrMapping/>
@@ -393,7 +762,7 @@
               <a:rPr lang="en-US" smtClean="0"/>
               <a:t>Click to edit Master title style</a:t>
             </a:r>
-            <a:endParaRPr lang="en-US"/>
+            <a:endParaRPr lang="en-IN"/>
           </a:p>
         </p:txBody>
       </p:sp>
@@ -445,7 +814,7 @@
               <a:rPr lang="en-US" smtClean="0"/>
               <a:t>Fifth level</a:t>
             </a:r>
-            <a:endParaRPr lang="en-US"/>
+            <a:endParaRPr lang="en-IN"/>
           </a:p>
         </p:txBody>
       </p:sp>
@@ -467,7 +836,7 @@
             <a:fld id="{1D8BD707-D9CF-40AE-B4C6-C98DA3205C09}" type="datetimeFigureOut">
               <a:rPr lang="en-US" smtClean="0"/>
               <a:pPr/>
-              <a:t>10/12/2019</a:t>
+              <a:t>1/3/2020</a:t>
             </a:fld>
             <a:endParaRPr lang="en-US"/>
           </a:p>
@@ -517,6 +886,11 @@
         </p:txBody>
       </p:sp>
     </p:spTree>
+    <p:extLst>
+      <p:ext uri="{BB962C8B-B14F-4D97-AF65-F5344CB8AC3E}">
+        <p14:creationId xmlns:p14="http://schemas.microsoft.com/office/powerpoint/2010/main" val="2439001898"/>
+      </p:ext>
+    </p:extLst>
   </p:cSld>
   <p:clrMapOvr>
     <a:masterClrMapping/>
@@ -553,8 +927,8 @@
         </p:nvSpPr>
         <p:spPr>
           <a:xfrm>
-            <a:off x="6629400" y="274638"/>
-            <a:ext cx="2057400" cy="5851525"/>
+            <a:off x="6629400" y="154782"/>
+            <a:ext cx="2057400" cy="3290888"/>
           </a:xfrm>
         </p:spPr>
         <p:txBody>
@@ -565,7 +939,7 @@
               <a:rPr lang="en-US" smtClean="0"/>
               <a:t>Click to edit Master title style</a:t>
             </a:r>
-            <a:endParaRPr lang="en-US"/>
+            <a:endParaRPr lang="en-IN"/>
           </a:p>
         </p:txBody>
       </p:sp>
@@ -581,8 +955,8 @@
         </p:nvSpPr>
         <p:spPr>
           <a:xfrm>
-            <a:off x="457200" y="274638"/>
-            <a:ext cx="6019800" cy="5851525"/>
+            <a:off x="457200" y="154782"/>
+            <a:ext cx="6019800" cy="3290888"/>
           </a:xfrm>
         </p:spPr>
         <p:txBody>
@@ -622,7 +996,7 @@
               <a:rPr lang="en-US" smtClean="0"/>
               <a:t>Fifth level</a:t>
             </a:r>
-            <a:endParaRPr lang="en-US"/>
+            <a:endParaRPr lang="en-IN"/>
           </a:p>
         </p:txBody>
       </p:sp>
@@ -644,7 +1018,7 @@
             <a:fld id="{1D8BD707-D9CF-40AE-B4C6-C98DA3205C09}" type="datetimeFigureOut">
               <a:rPr lang="en-US" smtClean="0"/>
               <a:pPr/>
-              <a:t>10/12/2019</a:t>
+              <a:t>1/3/2020</a:t>
             </a:fld>
             <a:endParaRPr lang="en-US"/>
           </a:p>
@@ -694,6 +1068,11 @@
         </p:txBody>
       </p:sp>
     </p:spTree>
+    <p:extLst>
+      <p:ext uri="{BB962C8B-B14F-4D97-AF65-F5344CB8AC3E}">
+        <p14:creationId xmlns:p14="http://schemas.microsoft.com/office/powerpoint/2010/main" val="1088610384"/>
+      </p:ext>
+    </p:extLst>
   </p:cSld>
   <p:clrMapOvr>
     <a:masterClrMapping/>
@@ -737,7 +1116,7 @@
               <a:rPr lang="en-US" smtClean="0"/>
               <a:t>Click to edit Master title style</a:t>
             </a:r>
-            <a:endParaRPr lang="en-US"/>
+            <a:endParaRPr lang="en-IN"/>
           </a:p>
         </p:txBody>
       </p:sp>
@@ -789,7 +1168,7 @@
               <a:rPr lang="en-US" smtClean="0"/>
               <a:t>Fifth level</a:t>
             </a:r>
-            <a:endParaRPr lang="en-US"/>
+            <a:endParaRPr lang="en-IN"/>
           </a:p>
         </p:txBody>
       </p:sp>
@@ -811,7 +1190,7 @@
             <a:fld id="{1D8BD707-D9CF-40AE-B4C6-C98DA3205C09}" type="datetimeFigureOut">
               <a:rPr lang="en-US" smtClean="0"/>
               <a:pPr/>
-              <a:t>10/12/2019</a:t>
+              <a:t>1/3/2020</a:t>
             </a:fld>
             <a:endParaRPr lang="en-US"/>
           </a:p>
@@ -861,6 +1240,11 @@
         </p:txBody>
       </p:sp>
     </p:spTree>
+    <p:extLst>
+      <p:ext uri="{BB962C8B-B14F-4D97-AF65-F5344CB8AC3E}">
+        <p14:creationId xmlns:p14="http://schemas.microsoft.com/office/powerpoint/2010/main" val="3183224941"/>
+      </p:ext>
+    </p:extLst>
   </p:cSld>
   <p:clrMapOvr>
     <a:masterClrMapping/>
@@ -897,8 +1281,8 @@
         </p:nvSpPr>
         <p:spPr>
           <a:xfrm>
-            <a:off x="722313" y="4406900"/>
-            <a:ext cx="7772400" cy="1362075"/>
+            <a:off x="722313" y="3305176"/>
+            <a:ext cx="7772400" cy="1021556"/>
           </a:xfrm>
         </p:spPr>
         <p:txBody>
@@ -913,7 +1297,7 @@
               <a:rPr lang="en-US" smtClean="0"/>
               <a:t>Click to edit Master title style</a:t>
             </a:r>
-            <a:endParaRPr lang="en-US"/>
+            <a:endParaRPr lang="en-IN"/>
           </a:p>
         </p:txBody>
       </p:sp>
@@ -929,8 +1313,8 @@
         </p:nvSpPr>
         <p:spPr>
           <a:xfrm>
-            <a:off x="722313" y="2906713"/>
-            <a:ext cx="7772400" cy="1500187"/>
+            <a:off x="722313" y="2180035"/>
+            <a:ext cx="7772400" cy="1125140"/>
           </a:xfrm>
         </p:spPr>
         <p:txBody>
@@ -1054,7 +1438,7 @@
             <a:fld id="{1D8BD707-D9CF-40AE-B4C6-C98DA3205C09}" type="datetimeFigureOut">
               <a:rPr lang="en-US" smtClean="0"/>
               <a:pPr/>
-              <a:t>10/12/2019</a:t>
+              <a:t>1/3/2020</a:t>
             </a:fld>
             <a:endParaRPr lang="en-US"/>
           </a:p>
@@ -1104,6 +1488,11 @@
         </p:txBody>
       </p:sp>
     </p:spTree>
+    <p:extLst>
+      <p:ext uri="{BB962C8B-B14F-4D97-AF65-F5344CB8AC3E}">
+        <p14:creationId xmlns:p14="http://schemas.microsoft.com/office/powerpoint/2010/main" val="3114959661"/>
+      </p:ext>
+    </p:extLst>
   </p:cSld>
   <p:clrMapOvr>
     <a:masterClrMapping/>
@@ -1147,7 +1536,7 @@
               <a:rPr lang="en-US" smtClean="0"/>
               <a:t>Click to edit Master title style</a:t>
             </a:r>
-            <a:endParaRPr lang="en-US"/>
+            <a:endParaRPr lang="en-IN"/>
           </a:p>
         </p:txBody>
       </p:sp>
@@ -1163,8 +1552,8 @@
         </p:nvSpPr>
         <p:spPr>
           <a:xfrm>
-            <a:off x="457200" y="1600200"/>
-            <a:ext cx="4038600" cy="4525963"/>
+            <a:off x="457200" y="900114"/>
+            <a:ext cx="4038600" cy="2545556"/>
           </a:xfrm>
         </p:spPr>
         <p:txBody>
@@ -1232,7 +1621,7 @@
               <a:rPr lang="en-US" smtClean="0"/>
               <a:t>Fifth level</a:t>
             </a:r>
-            <a:endParaRPr lang="en-US"/>
+            <a:endParaRPr lang="en-IN"/>
           </a:p>
         </p:txBody>
       </p:sp>
@@ -1248,8 +1637,8 @@
         </p:nvSpPr>
         <p:spPr>
           <a:xfrm>
-            <a:off x="4648200" y="1600200"/>
-            <a:ext cx="4038600" cy="4525963"/>
+            <a:off x="4648200" y="900114"/>
+            <a:ext cx="4038600" cy="2545556"/>
           </a:xfrm>
         </p:spPr>
         <p:txBody>
@@ -1317,7 +1706,7 @@
               <a:rPr lang="en-US" smtClean="0"/>
               <a:t>Fifth level</a:t>
             </a:r>
-            <a:endParaRPr lang="en-US"/>
+            <a:endParaRPr lang="en-IN"/>
           </a:p>
         </p:txBody>
       </p:sp>
@@ -1339,7 +1728,7 @@
             <a:fld id="{1D8BD707-D9CF-40AE-B4C6-C98DA3205C09}" type="datetimeFigureOut">
               <a:rPr lang="en-US" smtClean="0"/>
               <a:pPr/>
-              <a:t>10/12/2019</a:t>
+              <a:t>1/3/2020</a:t>
             </a:fld>
             <a:endParaRPr lang="en-US"/>
           </a:p>
@@ -1389,6 +1778,11 @@
         </p:txBody>
       </p:sp>
     </p:spTree>
+    <p:extLst>
+      <p:ext uri="{BB962C8B-B14F-4D97-AF65-F5344CB8AC3E}">
+        <p14:creationId xmlns:p14="http://schemas.microsoft.com/office/powerpoint/2010/main" val="976957337"/>
+      </p:ext>
+    </p:extLst>
   </p:cSld>
   <p:clrMapOvr>
     <a:masterClrMapping/>
@@ -1423,7 +1817,12 @@
             <p:ph type="title"/>
           </p:nvPr>
         </p:nvSpPr>
-        <p:spPr/>
+        <p:spPr>
+          <a:xfrm>
+            <a:off x="457200" y="205979"/>
+            <a:ext cx="8229600" cy="857250"/>
+          </a:xfrm>
+        </p:spPr>
         <p:txBody>
           <a:bodyPr/>
           <a:lstStyle>
@@ -1436,7 +1835,7 @@
               <a:rPr lang="en-US" smtClean="0"/>
               <a:t>Click to edit Master title style</a:t>
             </a:r>
-            <a:endParaRPr lang="en-US"/>
+            <a:endParaRPr lang="en-IN"/>
           </a:p>
         </p:txBody>
       </p:sp>
@@ -1452,8 +1851,8 @@
         </p:nvSpPr>
         <p:spPr>
           <a:xfrm>
-            <a:off x="457200" y="1535113"/>
-            <a:ext cx="4040188" cy="639762"/>
+            <a:off x="457200" y="1151335"/>
+            <a:ext cx="4040188" cy="479822"/>
           </a:xfrm>
         </p:spPr>
         <p:txBody>
@@ -1517,8 +1916,8 @@
         </p:nvSpPr>
         <p:spPr>
           <a:xfrm>
-            <a:off x="457200" y="2174875"/>
-            <a:ext cx="4040188" cy="3951288"/>
+            <a:off x="457200" y="1631156"/>
+            <a:ext cx="4040188" cy="2963466"/>
           </a:xfrm>
         </p:spPr>
         <p:txBody>
@@ -1586,7 +1985,7 @@
               <a:rPr lang="en-US" smtClean="0"/>
               <a:t>Fifth level</a:t>
             </a:r>
-            <a:endParaRPr lang="en-US"/>
+            <a:endParaRPr lang="en-IN"/>
           </a:p>
         </p:txBody>
       </p:sp>
@@ -1602,8 +2001,8 @@
         </p:nvSpPr>
         <p:spPr>
           <a:xfrm>
-            <a:off x="4645025" y="1535113"/>
-            <a:ext cx="4041775" cy="639762"/>
+            <a:off x="4645028" y="1151335"/>
+            <a:ext cx="4041775" cy="479822"/>
           </a:xfrm>
         </p:spPr>
         <p:txBody>
@@ -1667,8 +2066,8 @@
         </p:nvSpPr>
         <p:spPr>
           <a:xfrm>
-            <a:off x="4645025" y="2174875"/>
-            <a:ext cx="4041775" cy="3951288"/>
+            <a:off x="4645028" y="1631156"/>
+            <a:ext cx="4041775" cy="2963466"/>
           </a:xfrm>
         </p:spPr>
         <p:txBody>
@@ -1736,7 +2135,7 @@
               <a:rPr lang="en-US" smtClean="0"/>
               <a:t>Fifth level</a:t>
             </a:r>
-            <a:endParaRPr lang="en-US"/>
+            <a:endParaRPr lang="en-IN"/>
           </a:p>
         </p:txBody>
       </p:sp>
@@ -1758,7 +2157,7 @@
             <a:fld id="{1D8BD707-D9CF-40AE-B4C6-C98DA3205C09}" type="datetimeFigureOut">
               <a:rPr lang="en-US" smtClean="0"/>
               <a:pPr/>
-              <a:t>10/12/2019</a:t>
+              <a:t>1/3/2020</a:t>
             </a:fld>
             <a:endParaRPr lang="en-US"/>
           </a:p>
@@ -1808,6 +2207,11 @@
         </p:txBody>
       </p:sp>
     </p:spTree>
+    <p:extLst>
+      <p:ext uri="{BB962C8B-B14F-4D97-AF65-F5344CB8AC3E}">
+        <p14:creationId xmlns:p14="http://schemas.microsoft.com/office/powerpoint/2010/main" val="3893732210"/>
+      </p:ext>
+    </p:extLst>
   </p:cSld>
   <p:clrMapOvr>
     <a:masterClrMapping/>
@@ -1851,7 +2255,7 @@
               <a:rPr lang="en-US" smtClean="0"/>
               <a:t>Click to edit Master title style</a:t>
             </a:r>
-            <a:endParaRPr lang="en-US"/>
+            <a:endParaRPr lang="en-IN"/>
           </a:p>
         </p:txBody>
       </p:sp>
@@ -1873,7 +2277,7 @@
             <a:fld id="{1D8BD707-D9CF-40AE-B4C6-C98DA3205C09}" type="datetimeFigureOut">
               <a:rPr lang="en-US" smtClean="0"/>
               <a:pPr/>
-              <a:t>10/12/2019</a:t>
+              <a:t>1/3/2020</a:t>
             </a:fld>
             <a:endParaRPr lang="en-US"/>
           </a:p>
@@ -1923,6 +2327,11 @@
         </p:txBody>
       </p:sp>
     </p:spTree>
+    <p:extLst>
+      <p:ext uri="{BB962C8B-B14F-4D97-AF65-F5344CB8AC3E}">
+        <p14:creationId xmlns:p14="http://schemas.microsoft.com/office/powerpoint/2010/main" val="4225457244"/>
+      </p:ext>
+    </p:extLst>
   </p:cSld>
   <p:clrMapOvr>
     <a:masterClrMapping/>
@@ -1965,7 +2374,7 @@
             <a:fld id="{1D8BD707-D9CF-40AE-B4C6-C98DA3205C09}" type="datetimeFigureOut">
               <a:rPr lang="en-US" smtClean="0"/>
               <a:pPr/>
-              <a:t>10/12/2019</a:t>
+              <a:t>1/3/2020</a:t>
             </a:fld>
             <a:endParaRPr lang="en-US"/>
           </a:p>
@@ -2015,6 +2424,11 @@
         </p:txBody>
       </p:sp>
     </p:spTree>
+    <p:extLst>
+      <p:ext uri="{BB962C8B-B14F-4D97-AF65-F5344CB8AC3E}">
+        <p14:creationId xmlns:p14="http://schemas.microsoft.com/office/powerpoint/2010/main" val="1991064338"/>
+      </p:ext>
+    </p:extLst>
   </p:cSld>
   <p:clrMapOvr>
     <a:masterClrMapping/>
@@ -2051,8 +2465,8 @@
         </p:nvSpPr>
         <p:spPr>
           <a:xfrm>
-            <a:off x="457200" y="273050"/>
-            <a:ext cx="3008313" cy="1162050"/>
+            <a:off x="457203" y="204787"/>
+            <a:ext cx="3008313" cy="871538"/>
           </a:xfrm>
         </p:spPr>
         <p:txBody>
@@ -2067,7 +2481,7 @@
               <a:rPr lang="en-US" smtClean="0"/>
               <a:t>Click to edit Master title style</a:t>
             </a:r>
-            <a:endParaRPr lang="en-US"/>
+            <a:endParaRPr lang="en-IN"/>
           </a:p>
         </p:txBody>
       </p:sp>
@@ -2083,8 +2497,8 @@
         </p:nvSpPr>
         <p:spPr>
           <a:xfrm>
-            <a:off x="3575050" y="273050"/>
-            <a:ext cx="5111750" cy="5853113"/>
+            <a:off x="3575050" y="204789"/>
+            <a:ext cx="5111750" cy="4389835"/>
           </a:xfrm>
         </p:spPr>
         <p:txBody>
@@ -2152,7 +2566,7 @@
               <a:rPr lang="en-US" smtClean="0"/>
               <a:t>Fifth level</a:t>
             </a:r>
-            <a:endParaRPr lang="en-US"/>
+            <a:endParaRPr lang="en-IN"/>
           </a:p>
         </p:txBody>
       </p:sp>
@@ -2168,8 +2582,8 @@
         </p:nvSpPr>
         <p:spPr>
           <a:xfrm>
-            <a:off x="457200" y="1435100"/>
-            <a:ext cx="3008313" cy="4691063"/>
+            <a:off x="457203" y="1076327"/>
+            <a:ext cx="3008313" cy="3518297"/>
           </a:xfrm>
         </p:spPr>
         <p:txBody>
@@ -2239,7 +2653,7 @@
             <a:fld id="{1D8BD707-D9CF-40AE-B4C6-C98DA3205C09}" type="datetimeFigureOut">
               <a:rPr lang="en-US" smtClean="0"/>
               <a:pPr/>
-              <a:t>10/12/2019</a:t>
+              <a:t>1/3/2020</a:t>
             </a:fld>
             <a:endParaRPr lang="en-US"/>
           </a:p>
@@ -2289,6 +2703,11 @@
         </p:txBody>
       </p:sp>
     </p:spTree>
+    <p:extLst>
+      <p:ext uri="{BB962C8B-B14F-4D97-AF65-F5344CB8AC3E}">
+        <p14:creationId xmlns:p14="http://schemas.microsoft.com/office/powerpoint/2010/main" val="3295265714"/>
+      </p:ext>
+    </p:extLst>
   </p:cSld>
   <p:clrMapOvr>
     <a:masterClrMapping/>
@@ -2325,8 +2744,8 @@
         </p:nvSpPr>
         <p:spPr>
           <a:xfrm>
-            <a:off x="1792288" y="4800600"/>
-            <a:ext cx="5486400" cy="566738"/>
+            <a:off x="1792288" y="3600451"/>
+            <a:ext cx="5486400" cy="425054"/>
           </a:xfrm>
         </p:spPr>
         <p:txBody>
@@ -2341,7 +2760,7 @@
               <a:rPr lang="en-US" smtClean="0"/>
               <a:t>Click to edit Master title style</a:t>
             </a:r>
-            <a:endParaRPr lang="en-US"/>
+            <a:endParaRPr lang="en-IN"/>
           </a:p>
         </p:txBody>
       </p:sp>
@@ -2357,8 +2776,8 @@
         </p:nvSpPr>
         <p:spPr>
           <a:xfrm>
-            <a:off x="1792288" y="612775"/>
-            <a:ext cx="5486400" cy="4114800"/>
+            <a:off x="1792288" y="459581"/>
+            <a:ext cx="5486400" cy="3086100"/>
           </a:xfrm>
         </p:spPr>
         <p:txBody>
@@ -2402,7 +2821,7 @@
             </a:lvl9pPr>
           </a:lstStyle>
           <a:p>
-            <a:endParaRPr lang="en-US"/>
+            <a:endParaRPr lang="en-IN"/>
           </a:p>
         </p:txBody>
       </p:sp>
@@ -2418,8 +2837,8 @@
         </p:nvSpPr>
         <p:spPr>
           <a:xfrm>
-            <a:off x="1792288" y="5367338"/>
-            <a:ext cx="5486400" cy="804862"/>
+            <a:off x="1792288" y="4025504"/>
+            <a:ext cx="5486400" cy="603647"/>
           </a:xfrm>
         </p:spPr>
         <p:txBody>
@@ -2489,7 +2908,7 @@
             <a:fld id="{1D8BD707-D9CF-40AE-B4C6-C98DA3205C09}" type="datetimeFigureOut">
               <a:rPr lang="en-US" smtClean="0"/>
               <a:pPr/>
-              <a:t>10/12/2019</a:t>
+              <a:t>1/3/2020</a:t>
             </a:fld>
             <a:endParaRPr lang="en-US"/>
           </a:p>
@@ -2539,6 +2958,11 @@
         </p:txBody>
       </p:sp>
     </p:spTree>
+    <p:extLst>
+      <p:ext uri="{BB962C8B-B14F-4D97-AF65-F5344CB8AC3E}">
+        <p14:creationId xmlns:p14="http://schemas.microsoft.com/office/powerpoint/2010/main" val="1856944310"/>
+      </p:ext>
+    </p:extLst>
   </p:cSld>
   <p:clrMapOvr>
     <a:masterClrMapping/>
@@ -2550,9 +2974,17 @@
 <p:sldMaster xmlns:a="http://schemas.openxmlformats.org/drawingml/2006/main" xmlns:r="http://schemas.openxmlformats.org/officeDocument/2006/relationships" xmlns:p="http://schemas.openxmlformats.org/presentationml/2006/main">
   <p:cSld>
     <p:bg>
-      <p:bgRef idx="1001">
-        <a:schemeClr val="bg1"/>
-      </p:bgRef>
+      <p:bgPr>
+        <a:pattFill prst="pct5">
+          <a:fgClr>
+            <a:schemeClr val="bg2"/>
+          </a:fgClr>
+          <a:bgClr>
+            <a:schemeClr val="bg1"/>
+          </a:bgClr>
+        </a:pattFill>
+        <a:effectLst/>
+      </p:bgPr>
     </p:bg>
     <p:spTree>
       <p:nvGrpSpPr>
@@ -2580,8 +3012,8 @@
         </p:nvSpPr>
         <p:spPr>
           <a:xfrm>
-            <a:off x="457200" y="274638"/>
-            <a:ext cx="8229600" cy="1143000"/>
+            <a:off x="457200" y="205979"/>
+            <a:ext cx="8229600" cy="857250"/>
           </a:xfrm>
           <a:prstGeom prst="rect">
             <a:avLst/>
@@ -2597,7 +3029,7 @@
               <a:rPr lang="en-US" smtClean="0"/>
               <a:t>Click to edit Master title style</a:t>
             </a:r>
-            <a:endParaRPr lang="en-US"/>
+            <a:endParaRPr lang="en-IN"/>
           </a:p>
         </p:txBody>
       </p:sp>
@@ -2613,8 +3045,8 @@
         </p:nvSpPr>
         <p:spPr>
           <a:xfrm>
-            <a:off x="457200" y="1600200"/>
-            <a:ext cx="8229600" cy="4525963"/>
+            <a:off x="457200" y="1200151"/>
+            <a:ext cx="8229600" cy="3394472"/>
           </a:xfrm>
           <a:prstGeom prst="rect">
             <a:avLst/>
@@ -2659,7 +3091,7 @@
               <a:rPr lang="en-US" smtClean="0"/>
               <a:t>Fifth level</a:t>
             </a:r>
-            <a:endParaRPr lang="en-US"/>
+            <a:endParaRPr lang="en-IN"/>
           </a:p>
         </p:txBody>
       </p:sp>
@@ -2675,8 +3107,8 @@
         </p:nvSpPr>
         <p:spPr>
           <a:xfrm>
-            <a:off x="457200" y="6356350"/>
-            <a:ext cx="2133600" cy="365125"/>
+            <a:off x="457200" y="4767264"/>
+            <a:ext cx="2133600" cy="273844"/>
           </a:xfrm>
           <a:prstGeom prst="rect">
             <a:avLst/>
@@ -2699,7 +3131,7 @@
             <a:fld id="{1D8BD707-D9CF-40AE-B4C6-C98DA3205C09}" type="datetimeFigureOut">
               <a:rPr lang="en-US" smtClean="0"/>
               <a:pPr/>
-              <a:t>10/12/2019</a:t>
+              <a:t>1/3/2020</a:t>
             </a:fld>
             <a:endParaRPr lang="en-US"/>
           </a:p>
@@ -2717,8 +3149,8 @@
         </p:nvSpPr>
         <p:spPr>
           <a:xfrm>
-            <a:off x="3124200" y="6356350"/>
-            <a:ext cx="2895600" cy="365125"/>
+            <a:off x="3124200" y="4767264"/>
+            <a:ext cx="2895600" cy="273844"/>
           </a:xfrm>
           <a:prstGeom prst="rect">
             <a:avLst/>
@@ -2754,8 +3186,8 @@
         </p:nvSpPr>
         <p:spPr>
           <a:xfrm>
-            <a:off x="6553200" y="6356350"/>
-            <a:ext cx="2133600" cy="365125"/>
+            <a:off x="6553200" y="4767264"/>
+            <a:ext cx="2133600" cy="273844"/>
           </a:xfrm>
           <a:prstGeom prst="rect">
             <a:avLst/>
@@ -2785,20 +3217,25 @@
         </p:txBody>
       </p:sp>
     </p:spTree>
+    <p:extLst>
+      <p:ext uri="{BB962C8B-B14F-4D97-AF65-F5344CB8AC3E}">
+        <p14:creationId xmlns:p14="http://schemas.microsoft.com/office/powerpoint/2010/main" val="2911015249"/>
+      </p:ext>
+    </p:extLst>
   </p:cSld>
   <p:clrMap bg1="lt1" tx1="dk1" bg2="lt2" tx2="dk2" accent1="accent1" accent2="accent2" accent3="accent3" accent4="accent4" accent5="accent5" accent6="accent6" hlink="hlink" folHlink="folHlink"/>
   <p:sldLayoutIdLst>
-    <p:sldLayoutId id="2147483649" r:id="rId1"/>
-    <p:sldLayoutId id="2147483650" r:id="rId2"/>
-    <p:sldLayoutId id="2147483651" r:id="rId3"/>
-    <p:sldLayoutId id="2147483652" r:id="rId4"/>
-    <p:sldLayoutId id="2147483653" r:id="rId5"/>
-    <p:sldLayoutId id="2147483654" r:id="rId6"/>
-    <p:sldLayoutId id="2147483655" r:id="rId7"/>
-    <p:sldLayoutId id="2147483656" r:id="rId8"/>
-    <p:sldLayoutId id="2147483657" r:id="rId9"/>
-    <p:sldLayoutId id="2147483658" r:id="rId10"/>
-    <p:sldLayoutId id="2147483659" r:id="rId11"/>
+    <p:sldLayoutId id="2147483685" r:id="rId1"/>
+    <p:sldLayoutId id="2147483686" r:id="rId2"/>
+    <p:sldLayoutId id="2147483687" r:id="rId3"/>
+    <p:sldLayoutId id="2147483688" r:id="rId4"/>
+    <p:sldLayoutId id="2147483689" r:id="rId5"/>
+    <p:sldLayoutId id="2147483690" r:id="rId6"/>
+    <p:sldLayoutId id="2147483691" r:id="rId7"/>
+    <p:sldLayoutId id="2147483692" r:id="rId8"/>
+    <p:sldLayoutId id="2147483693" r:id="rId9"/>
+    <p:sldLayoutId id="2147483694" r:id="rId10"/>
+    <p:sldLayoutId id="2147483695" r:id="rId11"/>
   </p:sldLayoutIdLst>
   <p:txStyles>
     <p:titleStyle>
@@ -3083,15 +3520,57 @@
         <p:spPr/>
         <p:txBody>
           <a:bodyPr>
-            <a:normAutofit/>
+            <a:normAutofit fontScale="90000"/>
           </a:bodyPr>
           <a:lstStyle/>
           <a:p>
             <a:r>
-              <a:rPr lang="en-IN" sz="4000" dirty="0" smtClean="0"/>
-              <a:t>Churn Analysis Of Bank Customers</a:t>
-            </a:r>
-            <a:endParaRPr lang="en-IN" sz="4000" dirty="0"/>
+              <a:rPr lang="en-IN" sz="4000" dirty="0" smtClean="0">
+                <a:solidFill>
+                  <a:schemeClr val="accent6">
+                    <a:lumMod val="75000"/>
+                  </a:schemeClr>
+                </a:solidFill>
+              </a:rPr>
+              <a:t>Predicting </a:t>
+            </a:r>
+            <a:r>
+              <a:rPr lang="en-IN" sz="4000" dirty="0">
+                <a:solidFill>
+                  <a:schemeClr val="accent6">
+                    <a:lumMod val="75000"/>
+                  </a:schemeClr>
+                </a:solidFill>
+              </a:rPr>
+              <a:t>T</a:t>
+            </a:r>
+            <a:r>
+              <a:rPr lang="en-IN" sz="4000" dirty="0" smtClean="0">
+                <a:solidFill>
+                  <a:schemeClr val="accent6">
+                    <a:lumMod val="75000"/>
+                  </a:schemeClr>
+                </a:solidFill>
+              </a:rPr>
+              <a:t>he Churn Of </a:t>
+            </a:r>
+            <a:r>
+              <a:rPr lang="en-IN" sz="4000" dirty="0" smtClean="0">
+                <a:solidFill>
+                  <a:schemeClr val="accent6">
+                    <a:lumMod val="75000"/>
+                  </a:schemeClr>
+                </a:solidFill>
+              </a:rPr>
+              <a:t>Bank Customers</a:t>
+            </a:r>
+            <a:endParaRPr lang="en-IN" sz="4000" dirty="0">
+              <a:solidFill>
+                <a:schemeClr val="accent6">
+                  <a:lumMod val="75000"/>
+                </a:schemeClr>
+              </a:solidFill>
+            </a:endParaRPr>
           </a:p>
         </p:txBody>
       </p:sp>
@@ -3107,8 +3586,8 @@
         </p:nvSpPr>
         <p:spPr>
           <a:xfrm>
-            <a:off x="457200" y="3886200"/>
-            <a:ext cx="8229600" cy="1752600"/>
+            <a:off x="1219200" y="2266950"/>
+            <a:ext cx="6553200" cy="914400"/>
           </a:xfrm>
         </p:spPr>
         <p:txBody>
@@ -3117,16 +3596,10 @@
           </a:bodyPr>
           <a:lstStyle/>
           <a:p>
-            <a:r>
-              <a:rPr lang="en-IN" sz="2800" dirty="0" smtClean="0"/>
-              <a:t>Springboard DSC</a:t>
-            </a:r>
-          </a:p>
-          <a:p>
-            <a:endParaRPr lang="en-IN" sz="2800" dirty="0"/>
-          </a:p>
-          <a:p>
             <a:pPr algn="r"/>
+            <a:endParaRPr lang="en-IN" sz="2400" dirty="0" smtClean="0"/>
+          </a:p>
+          <a:p>
             <a:r>
               <a:rPr lang="en-IN" sz="2400" dirty="0" smtClean="0"/>
               <a:t>- </a:t>
@@ -3147,6 +3620,70 @@
           </a:p>
         </p:txBody>
       </p:sp>
+      <p:pic>
+        <p:nvPicPr>
+          <p:cNvPr id="14338" name="Picture 2"/>
+          <p:cNvPicPr>
+            <a:picLocks noChangeAspect="1" noChangeArrowheads="1"/>
+          </p:cNvPicPr>
+          <p:nvPr/>
+        </p:nvPicPr>
+        <p:blipFill>
+          <a:blip r:embed="rId2">
+            <a:extLst>
+              <a:ext uri="{28A0092B-C50C-407E-A947-70E740481C1C}">
+                <a14:useLocalDpi xmlns:a14="http://schemas.microsoft.com/office/drawing/2010/main" val="0"/>
+              </a:ext>
+            </a:extLst>
+          </a:blip>
+          <a:srcRect/>
+          <a:stretch>
+            <a:fillRect/>
+          </a:stretch>
+        </p:blipFill>
+        <p:spPr bwMode="auto">
+          <a:xfrm>
+            <a:off x="3383255" y="1047750"/>
+            <a:ext cx="2165350" cy="609600"/>
+          </a:xfrm>
+          <a:prstGeom prst="rect">
+            <a:avLst/>
+          </a:prstGeom>
+          <a:noFill/>
+          <a:ln>
+            <a:noFill/>
+          </a:ln>
+          <a:effectLst/>
+          <a:extLst>
+            <a:ext uri="{909E8E84-426E-40DD-AFC4-6F175D3DCCD1}">
+              <a14:hiddenFill xmlns:a14="http://schemas.microsoft.com/office/drawing/2010/main">
+                <a:solidFill>
+                  <a:schemeClr val="accent1"/>
+                </a:solidFill>
+              </a14:hiddenFill>
+            </a:ext>
+            <a:ext uri="{91240B29-F687-4F45-9708-019B960494DF}">
+              <a14:hiddenLine xmlns:a14="http://schemas.microsoft.com/office/drawing/2010/main" w="9525">
+                <a:solidFill>
+                  <a:schemeClr val="tx1"/>
+                </a:solidFill>
+                <a:miter lim="800000"/>
+                <a:headEnd/>
+                <a:tailEnd/>
+              </a14:hiddenLine>
+            </a:ext>
+            <a:ext uri="{AF507438-7753-43E0-B8FC-AC1667EBCBE1}">
+              <a14:hiddenEffects xmlns:a14="http://schemas.microsoft.com/office/drawing/2010/main">
+                <a:effectLst>
+                  <a:outerShdw dist="35921" dir="2700000" algn="ctr" rotWithShape="0">
+                    <a:schemeClr val="bg2"/>
+                  </a:outerShdw>
+                </a:effectLst>
+              </a14:hiddenEffects>
+            </a:ext>
+          </a:extLst>
+        </p:spPr>
+      </p:pic>
     </p:spTree>
     <p:extLst>
       <p:ext uri="{BB962C8B-B14F-4D97-AF65-F5344CB8AC3E}">
@@ -3157,6 +3694,13 @@
   <p:clrMapOvr>
     <a:masterClrMapping/>
   </p:clrMapOvr>
+  <p:timing>
+    <p:tnLst>
+      <p:par>
+        <p:cTn id="1" dur="indefinite" restart="never" nodeType="tmRoot"/>
+      </p:par>
+    </p:tnLst>
+  </p:timing>
 </p:sld>
 </file>
 
@@ -3187,34 +3731,122 @@
             <p:ph type="title"/>
           </p:nvPr>
         </p:nvSpPr>
-        <p:spPr/>
+        <p:spPr>
+          <a:xfrm>
+            <a:off x="457200" y="4724"/>
+            <a:ext cx="8229600" cy="857250"/>
+          </a:xfrm>
+        </p:spPr>
         <p:txBody>
           <a:bodyPr/>
           <a:lstStyle/>
           <a:p>
-            <a:endParaRPr lang="en-IN"/>
-          </a:p>
-        </p:txBody>
-      </p:sp>
-      <p:sp>
-        <p:nvSpPr>
-          <p:cNvPr id="3" name="Content Placeholder 2"/>
-          <p:cNvSpPr>
-            <a:spLocks noGrp="1"/>
-          </p:cNvSpPr>
+            <a:r>
+              <a:rPr lang="en-IN" dirty="0" smtClean="0">
+                <a:solidFill>
+                  <a:schemeClr val="accent6">
+                    <a:lumMod val="75000"/>
+                  </a:schemeClr>
+                </a:solidFill>
+              </a:rPr>
+              <a:t>Balance </a:t>
+            </a:r>
+            <a:r>
+              <a:rPr lang="en-IN" dirty="0" err="1" smtClean="0">
+                <a:solidFill>
+                  <a:schemeClr val="accent6">
+                    <a:lumMod val="75000"/>
+                  </a:schemeClr>
+                </a:solidFill>
+              </a:rPr>
+              <a:t>vs</a:t>
+            </a:r>
+            <a:r>
+              <a:rPr lang="en-IN" dirty="0" smtClean="0">
+                <a:solidFill>
+                  <a:schemeClr val="accent6">
+                    <a:lumMod val="75000"/>
+                  </a:schemeClr>
+                </a:solidFill>
+              </a:rPr>
+              <a:t> others</a:t>
+            </a:r>
+            <a:endParaRPr lang="en-IN" dirty="0">
+              <a:solidFill>
+                <a:schemeClr val="accent6">
+                  <a:lumMod val="75000"/>
+                </a:schemeClr>
+              </a:solidFill>
+            </a:endParaRPr>
+          </a:p>
+        </p:txBody>
+      </p:sp>
+      <p:pic>
+        <p:nvPicPr>
+          <p:cNvPr id="5122" name="Picture 2"/>
+          <p:cNvPicPr>
+            <a:picLocks noGrp="1" noChangeAspect="1" noChangeArrowheads="1"/>
+          </p:cNvPicPr>
           <p:nvPr>
             <p:ph idx="1"/>
           </p:nvPr>
-        </p:nvSpPr>
-        <p:spPr/>
-        <p:txBody>
-          <a:bodyPr/>
-          <a:lstStyle/>
-          <a:p>
-            <a:endParaRPr lang="en-IN"/>
-          </a:p>
-        </p:txBody>
-      </p:sp>
+        </p:nvPicPr>
+        <p:blipFill>
+          <a:blip r:embed="rId2">
+            <a:extLst>
+              <a:ext uri="{28A0092B-C50C-407E-A947-70E740481C1C}">
+                <a14:useLocalDpi xmlns:a14="http://schemas.microsoft.com/office/drawing/2010/main" val="0"/>
+              </a:ext>
+            </a:extLst>
+          </a:blip>
+          <a:srcRect/>
+          <a:stretch>
+            <a:fillRect/>
+          </a:stretch>
+        </p:blipFill>
+        <p:spPr bwMode="auto">
+          <a:xfrm>
+            <a:off x="1836233" y="819150"/>
+            <a:ext cx="5478967" cy="4280959"/>
+          </a:xfrm>
+          <a:prstGeom prst="rect">
+            <a:avLst/>
+          </a:prstGeom>
+          <a:noFill/>
+          <a:ln>
+            <a:noFill/>
+          </a:ln>
+          <a:effectLst/>
+          <a:extLst>
+            <a:ext uri="{909E8E84-426E-40DD-AFC4-6F175D3DCCD1}">
+              <a14:hiddenFill xmlns:a14="http://schemas.microsoft.com/office/drawing/2010/main">
+                <a:solidFill>
+                  <a:schemeClr val="accent1"/>
+                </a:solidFill>
+              </a14:hiddenFill>
+            </a:ext>
+            <a:ext uri="{91240B29-F687-4F45-9708-019B960494DF}">
+              <a14:hiddenLine xmlns:a14="http://schemas.microsoft.com/office/drawing/2010/main" w="9525">
+                <a:solidFill>
+                  <a:schemeClr val="tx1"/>
+                </a:solidFill>
+                <a:miter lim="800000"/>
+                <a:headEnd/>
+                <a:tailEnd/>
+              </a14:hiddenLine>
+            </a:ext>
+            <a:ext uri="{AF507438-7753-43E0-B8FC-AC1667EBCBE1}">
+              <a14:hiddenEffects xmlns:a14="http://schemas.microsoft.com/office/drawing/2010/main">
+                <a:effectLst>
+                  <a:outerShdw dist="35921" dir="2700000" algn="ctr" rotWithShape="0">
+                    <a:schemeClr val="bg2"/>
+                  </a:outerShdw>
+                </a:effectLst>
+              </a14:hiddenEffects>
+            </a:ext>
+          </a:extLst>
+        </p:spPr>
+      </p:pic>
     </p:spTree>
     <p:extLst>
       <p:ext uri="{BB962C8B-B14F-4D97-AF65-F5344CB8AC3E}">
@@ -3225,6 +3857,13 @@
   <p:clrMapOvr>
     <a:masterClrMapping/>
   </p:clrMapOvr>
+  <p:timing>
+    <p:tnLst>
+      <p:par>
+        <p:cTn id="1" dur="indefinite" restart="never" nodeType="tmRoot"/>
+      </p:par>
+    </p:tnLst>
+  </p:timing>
 </p:sld>
 </file>
 
@@ -3255,34 +3894,121 @@
             <p:ph type="title"/>
           </p:nvPr>
         </p:nvSpPr>
-        <p:spPr/>
+        <p:spPr>
+          <a:xfrm>
+            <a:off x="457200" y="0"/>
+            <a:ext cx="8229600" cy="857250"/>
+          </a:xfrm>
+        </p:spPr>
         <p:txBody>
           <a:bodyPr/>
           <a:lstStyle/>
           <a:p>
-            <a:endParaRPr lang="en-IN"/>
-          </a:p>
-        </p:txBody>
-      </p:sp>
-      <p:sp>
-        <p:nvSpPr>
-          <p:cNvPr id="3" name="Content Placeholder 2"/>
-          <p:cNvSpPr>
-            <a:spLocks noGrp="1"/>
-          </p:cNvSpPr>
+            <a:r>
+              <a:rPr lang="en-IN" dirty="0" smtClean="0">
+                <a:solidFill>
+                  <a:schemeClr val="accent6">
+                    <a:lumMod val="75000"/>
+                  </a:schemeClr>
+                </a:solidFill>
+              </a:rPr>
+              <a:t>Tenure </a:t>
+            </a:r>
+            <a:r>
+              <a:rPr lang="en-IN" dirty="0" err="1" smtClean="0">
+                <a:solidFill>
+                  <a:schemeClr val="accent6">
+                    <a:lumMod val="75000"/>
+                  </a:schemeClr>
+                </a:solidFill>
+              </a:rPr>
+              <a:t>vs</a:t>
+            </a:r>
+            <a:r>
+              <a:rPr lang="en-IN" dirty="0" smtClean="0">
+                <a:solidFill>
+                  <a:schemeClr val="accent6">
+                    <a:lumMod val="75000"/>
+                  </a:schemeClr>
+                </a:solidFill>
+              </a:rPr>
+              <a:t> others</a:t>
+            </a:r>
+            <a:endParaRPr lang="en-IN" dirty="0">
+              <a:solidFill>
+                <a:schemeClr val="accent6">
+                  <a:lumMod val="75000"/>
+                </a:schemeClr>
+              </a:solidFill>
+            </a:endParaRPr>
+          </a:p>
+        </p:txBody>
+      </p:sp>
+      <p:pic>
+        <p:nvPicPr>
+          <p:cNvPr id="6147" name="Picture 3"/>
+          <p:cNvPicPr>
+            <a:picLocks noGrp="1" noChangeAspect="1" noChangeArrowheads="1"/>
+          </p:cNvPicPr>
           <p:nvPr>
             <p:ph idx="1"/>
           </p:nvPr>
-        </p:nvSpPr>
-        <p:spPr/>
-        <p:txBody>
-          <a:bodyPr/>
-          <a:lstStyle/>
-          <a:p>
-            <a:endParaRPr lang="en-IN"/>
-          </a:p>
-        </p:txBody>
-      </p:sp>
+        </p:nvPicPr>
+        <p:blipFill>
+          <a:blip r:embed="rId3">
+            <a:extLst>
+              <a:ext uri="{28A0092B-C50C-407E-A947-70E740481C1C}">
+                <a14:useLocalDpi xmlns:a14="http://schemas.microsoft.com/office/drawing/2010/main" val="0"/>
+              </a:ext>
+            </a:extLst>
+          </a:blip>
+          <a:stretch>
+            <a:fillRect/>
+          </a:stretch>
+        </p:blipFill>
+        <p:spPr bwMode="auto">
+          <a:xfrm>
+            <a:off x="1752600" y="700296"/>
+            <a:ext cx="5624007" cy="4386054"/>
+          </a:xfrm>
+          <a:prstGeom prst="rect">
+            <a:avLst/>
+          </a:prstGeom>
+          <a:noFill/>
+          <a:ln>
+            <a:noFill/>
+          </a:ln>
+          <a:effectLst/>
+          <a:extLst>
+            <a:ext uri="{909E8E84-426E-40DD-AFC4-6F175D3DCCD1}">
+              <a14:hiddenFill xmlns:a14="http://schemas.microsoft.com/office/drawing/2010/main">
+                <a:solidFill>
+                  <a:schemeClr val="accent1"/>
+                </a:solidFill>
+              </a14:hiddenFill>
+            </a:ext>
+            <a:ext uri="{91240B29-F687-4F45-9708-019B960494DF}">
+              <a14:hiddenLine xmlns:a14="http://schemas.microsoft.com/office/drawing/2010/main" w="9525">
+                <a:solidFill>
+                  <a:schemeClr val="tx1"/>
+                </a:solidFill>
+                <a:miter lim="800000"/>
+                <a:headEnd/>
+                <a:tailEnd/>
+              </a14:hiddenLine>
+            </a:ext>
+            <a:ext uri="{AF507438-7753-43E0-B8FC-AC1667EBCBE1}">
+              <a14:hiddenEffects xmlns:a14="http://schemas.microsoft.com/office/drawing/2010/main">
+                <a:effectLst>
+                  <a:outerShdw dist="35921" dir="2700000" algn="ctr" rotWithShape="0">
+                    <a:schemeClr val="bg2"/>
+                  </a:outerShdw>
+                </a:effectLst>
+              </a14:hiddenEffects>
+            </a:ext>
+          </a:extLst>
+        </p:spPr>
+      </p:pic>
     </p:spTree>
     <p:extLst>
       <p:ext uri="{BB962C8B-B14F-4D97-AF65-F5344CB8AC3E}">
@@ -3291,8 +4017,15 @@
     </p:extLst>
   </p:cSld>
   <p:clrMapOvr>
-    <a:masterClrMapping/>
+    <a:overrideClrMapping bg1="lt1" tx1="dk1" bg2="lt2" tx2="dk2" accent1="accent1" accent2="accent2" accent3="accent3" accent4="accent4" accent5="accent5" accent6="accent6" hlink="hlink" folHlink="folHlink"/>
   </p:clrMapOvr>
+  <p:timing>
+    <p:tnLst>
+      <p:par>
+        <p:cTn id="1" dur="indefinite" restart="never" nodeType="tmRoot"/>
+      </p:par>
+    </p:tnLst>
+  </p:timing>
 </p:sld>
 </file>
 
@@ -3323,34 +4056,122 @@
             <p:ph type="title"/>
           </p:nvPr>
         </p:nvSpPr>
-        <p:spPr/>
+        <p:spPr>
+          <a:xfrm>
+            <a:off x="457200" y="0"/>
+            <a:ext cx="8229600" cy="857250"/>
+          </a:xfrm>
+        </p:spPr>
         <p:txBody>
           <a:bodyPr/>
           <a:lstStyle/>
           <a:p>
-            <a:endParaRPr lang="en-IN"/>
-          </a:p>
-        </p:txBody>
-      </p:sp>
-      <p:sp>
-        <p:nvSpPr>
-          <p:cNvPr id="3" name="Content Placeholder 2"/>
-          <p:cNvSpPr>
-            <a:spLocks noGrp="1"/>
-          </p:cNvSpPr>
+            <a:r>
+              <a:rPr lang="en-IN" dirty="0" smtClean="0">
+                <a:solidFill>
+                  <a:schemeClr val="accent6">
+                    <a:lumMod val="75000"/>
+                  </a:schemeClr>
+                </a:solidFill>
+              </a:rPr>
+              <a:t>Number of Products </a:t>
+            </a:r>
+            <a:r>
+              <a:rPr lang="en-IN" dirty="0" err="1" smtClean="0">
+                <a:solidFill>
+                  <a:schemeClr val="accent6">
+                    <a:lumMod val="75000"/>
+                  </a:schemeClr>
+                </a:solidFill>
+              </a:rPr>
+              <a:t>vs</a:t>
+            </a:r>
+            <a:r>
+              <a:rPr lang="en-IN" dirty="0" smtClean="0">
+                <a:solidFill>
+                  <a:schemeClr val="accent6">
+                    <a:lumMod val="75000"/>
+                  </a:schemeClr>
+                </a:solidFill>
+              </a:rPr>
+              <a:t> others</a:t>
+            </a:r>
+            <a:endParaRPr lang="en-IN" dirty="0">
+              <a:solidFill>
+                <a:schemeClr val="accent6">
+                  <a:lumMod val="75000"/>
+                </a:schemeClr>
+              </a:solidFill>
+            </a:endParaRPr>
+          </a:p>
+        </p:txBody>
+      </p:sp>
+      <p:pic>
+        <p:nvPicPr>
+          <p:cNvPr id="7170" name="Picture 2"/>
+          <p:cNvPicPr>
+            <a:picLocks noGrp="1" noChangeAspect="1" noChangeArrowheads="1"/>
+          </p:cNvPicPr>
           <p:nvPr>
             <p:ph idx="1"/>
           </p:nvPr>
-        </p:nvSpPr>
-        <p:spPr/>
-        <p:txBody>
-          <a:bodyPr/>
-          <a:lstStyle/>
-          <a:p>
-            <a:endParaRPr lang="en-IN"/>
-          </a:p>
-        </p:txBody>
-      </p:sp>
+        </p:nvPicPr>
+        <p:blipFill>
+          <a:blip r:embed="rId2">
+            <a:extLst>
+              <a:ext uri="{28A0092B-C50C-407E-A947-70E740481C1C}">
+                <a14:useLocalDpi xmlns:a14="http://schemas.microsoft.com/office/drawing/2010/main" val="0"/>
+              </a:ext>
+            </a:extLst>
+          </a:blip>
+          <a:srcRect/>
+          <a:stretch>
+            <a:fillRect/>
+          </a:stretch>
+        </p:blipFill>
+        <p:spPr bwMode="auto">
+          <a:xfrm>
+            <a:off x="1752600" y="693378"/>
+            <a:ext cx="5410200" cy="4375157"/>
+          </a:xfrm>
+          <a:prstGeom prst="rect">
+            <a:avLst/>
+          </a:prstGeom>
+          <a:noFill/>
+          <a:ln>
+            <a:noFill/>
+          </a:ln>
+          <a:effectLst/>
+          <a:extLst>
+            <a:ext uri="{909E8E84-426E-40DD-AFC4-6F175D3DCCD1}">
+              <a14:hiddenFill xmlns:a14="http://schemas.microsoft.com/office/drawing/2010/main">
+                <a:solidFill>
+                  <a:schemeClr val="accent1"/>
+                </a:solidFill>
+              </a14:hiddenFill>
+            </a:ext>
+            <a:ext uri="{91240B29-F687-4F45-9708-019B960494DF}">
+              <a14:hiddenLine xmlns:a14="http://schemas.microsoft.com/office/drawing/2010/main" w="9525">
+                <a:solidFill>
+                  <a:schemeClr val="tx1"/>
+                </a:solidFill>
+                <a:miter lim="800000"/>
+                <a:headEnd/>
+                <a:tailEnd/>
+              </a14:hiddenLine>
+            </a:ext>
+            <a:ext uri="{AF507438-7753-43E0-B8FC-AC1667EBCBE1}">
+              <a14:hiddenEffects xmlns:a14="http://schemas.microsoft.com/office/drawing/2010/main">
+                <a:effectLst>
+                  <a:outerShdw dist="35921" dir="2700000" algn="ctr" rotWithShape="0">
+                    <a:schemeClr val="bg2"/>
+                  </a:outerShdw>
+                </a:effectLst>
+              </a14:hiddenEffects>
+            </a:ext>
+          </a:extLst>
+        </p:spPr>
+      </p:pic>
     </p:spTree>
     <p:extLst>
       <p:ext uri="{BB962C8B-B14F-4D97-AF65-F5344CB8AC3E}">
@@ -3361,6 +4182,1217 @@
   <p:clrMapOvr>
     <a:masterClrMapping/>
   </p:clrMapOvr>
+  <p:timing>
+    <p:tnLst>
+      <p:par>
+        <p:cTn id="1" dur="indefinite" restart="never" nodeType="tmRoot"/>
+      </p:par>
+    </p:tnLst>
+  </p:timing>
+</p:sld>
+</file>
+
+<file path=ppt/slides/slide13.xml><?xml version="1.0" encoding="utf-8"?>
+<p:sld xmlns:a="http://schemas.openxmlformats.org/drawingml/2006/main" xmlns:r="http://schemas.openxmlformats.org/officeDocument/2006/relationships" xmlns:p="http://schemas.openxmlformats.org/presentationml/2006/main">
+  <p:cSld>
+    <p:spTree>
+      <p:nvGrpSpPr>
+        <p:cNvPr id="1" name=""/>
+        <p:cNvGrpSpPr/>
+        <p:nvPr/>
+      </p:nvGrpSpPr>
+      <p:grpSpPr>
+        <a:xfrm>
+          <a:off x="0" y="0"/>
+          <a:ext cx="0" cy="0"/>
+          <a:chOff x="0" y="0"/>
+          <a:chExt cx="0" cy="0"/>
+        </a:xfrm>
+      </p:grpSpPr>
+      <p:sp>
+        <p:nvSpPr>
+          <p:cNvPr id="2" name="Title 1"/>
+          <p:cNvSpPr>
+            <a:spLocks noGrp="1"/>
+          </p:cNvSpPr>
+          <p:nvPr>
+            <p:ph type="title"/>
+          </p:nvPr>
+        </p:nvSpPr>
+        <p:spPr>
+          <a:xfrm>
+            <a:off x="457200" y="0"/>
+            <a:ext cx="8229600" cy="857250"/>
+          </a:xfrm>
+        </p:spPr>
+        <p:txBody>
+          <a:bodyPr/>
+          <a:lstStyle/>
+          <a:p>
+            <a:r>
+              <a:rPr lang="en-IN" dirty="0" smtClean="0">
+                <a:solidFill>
+                  <a:schemeClr val="accent6">
+                    <a:lumMod val="75000"/>
+                  </a:schemeClr>
+                </a:solidFill>
+              </a:rPr>
+              <a:t>Estimated Salary </a:t>
+            </a:r>
+            <a:r>
+              <a:rPr lang="en-IN" dirty="0" err="1" smtClean="0">
+                <a:solidFill>
+                  <a:schemeClr val="accent6">
+                    <a:lumMod val="75000"/>
+                  </a:schemeClr>
+                </a:solidFill>
+              </a:rPr>
+              <a:t>vs</a:t>
+            </a:r>
+            <a:r>
+              <a:rPr lang="en-IN" dirty="0" smtClean="0">
+                <a:solidFill>
+                  <a:schemeClr val="accent6">
+                    <a:lumMod val="75000"/>
+                  </a:schemeClr>
+                </a:solidFill>
+              </a:rPr>
+              <a:t> Others</a:t>
+            </a:r>
+            <a:endParaRPr lang="en-IN" dirty="0">
+              <a:solidFill>
+                <a:schemeClr val="accent6">
+                  <a:lumMod val="75000"/>
+                </a:schemeClr>
+              </a:solidFill>
+            </a:endParaRPr>
+          </a:p>
+        </p:txBody>
+      </p:sp>
+      <p:pic>
+        <p:nvPicPr>
+          <p:cNvPr id="8194" name="Picture 2"/>
+          <p:cNvPicPr>
+            <a:picLocks noGrp="1" noChangeAspect="1" noChangeArrowheads="1"/>
+          </p:cNvPicPr>
+          <p:nvPr>
+            <p:ph idx="1"/>
+          </p:nvPr>
+        </p:nvPicPr>
+        <p:blipFill>
+          <a:blip r:embed="rId2">
+            <a:extLst>
+              <a:ext uri="{28A0092B-C50C-407E-A947-70E740481C1C}">
+                <a14:useLocalDpi xmlns:a14="http://schemas.microsoft.com/office/drawing/2010/main" val="0"/>
+              </a:ext>
+            </a:extLst>
+          </a:blip>
+          <a:srcRect/>
+          <a:stretch>
+            <a:fillRect/>
+          </a:stretch>
+        </p:blipFill>
+        <p:spPr bwMode="auto">
+          <a:xfrm>
+            <a:off x="1799722" y="666750"/>
+            <a:ext cx="5515478" cy="4437479"/>
+          </a:xfrm>
+          <a:prstGeom prst="rect">
+            <a:avLst/>
+          </a:prstGeom>
+          <a:noFill/>
+          <a:ln>
+            <a:noFill/>
+          </a:ln>
+          <a:effectLst/>
+          <a:extLst>
+            <a:ext uri="{909E8E84-426E-40DD-AFC4-6F175D3DCCD1}">
+              <a14:hiddenFill xmlns:a14="http://schemas.microsoft.com/office/drawing/2010/main">
+                <a:solidFill>
+                  <a:schemeClr val="accent1"/>
+                </a:solidFill>
+              </a14:hiddenFill>
+            </a:ext>
+            <a:ext uri="{91240B29-F687-4F45-9708-019B960494DF}">
+              <a14:hiddenLine xmlns:a14="http://schemas.microsoft.com/office/drawing/2010/main" w="9525">
+                <a:solidFill>
+                  <a:schemeClr val="tx1"/>
+                </a:solidFill>
+                <a:miter lim="800000"/>
+                <a:headEnd/>
+                <a:tailEnd/>
+              </a14:hiddenLine>
+            </a:ext>
+            <a:ext uri="{AF507438-7753-43E0-B8FC-AC1667EBCBE1}">
+              <a14:hiddenEffects xmlns:a14="http://schemas.microsoft.com/office/drawing/2010/main">
+                <a:effectLst>
+                  <a:outerShdw dist="35921" dir="2700000" algn="ctr" rotWithShape="0">
+                    <a:schemeClr val="bg2"/>
+                  </a:outerShdw>
+                </a:effectLst>
+              </a14:hiddenEffects>
+            </a:ext>
+          </a:extLst>
+        </p:spPr>
+      </p:pic>
+    </p:spTree>
+    <p:extLst>
+      <p:ext uri="{BB962C8B-B14F-4D97-AF65-F5344CB8AC3E}">
+        <p14:creationId xmlns:p14="http://schemas.microsoft.com/office/powerpoint/2010/main" val="1678760086"/>
+      </p:ext>
+    </p:extLst>
+  </p:cSld>
+  <p:clrMapOvr>
+    <a:masterClrMapping/>
+  </p:clrMapOvr>
+  <p:timing>
+    <p:tnLst>
+      <p:par>
+        <p:cTn id="1" dur="indefinite" restart="never" nodeType="tmRoot"/>
+      </p:par>
+    </p:tnLst>
+  </p:timing>
+</p:sld>
+</file>
+
+<file path=ppt/slides/slide14.xml><?xml version="1.0" encoding="utf-8"?>
+<p:sld xmlns:a="http://schemas.openxmlformats.org/drawingml/2006/main" xmlns:r="http://schemas.openxmlformats.org/officeDocument/2006/relationships" xmlns:p="http://schemas.openxmlformats.org/presentationml/2006/main">
+  <p:cSld>
+    <p:spTree>
+      <p:nvGrpSpPr>
+        <p:cNvPr id="1" name=""/>
+        <p:cNvGrpSpPr/>
+        <p:nvPr/>
+      </p:nvGrpSpPr>
+      <p:grpSpPr>
+        <a:xfrm>
+          <a:off x="0" y="0"/>
+          <a:ext cx="0" cy="0"/>
+          <a:chOff x="0" y="0"/>
+          <a:chExt cx="0" cy="0"/>
+        </a:xfrm>
+      </p:grpSpPr>
+      <p:sp>
+        <p:nvSpPr>
+          <p:cNvPr id="2" name="Title 1"/>
+          <p:cNvSpPr>
+            <a:spLocks noGrp="1"/>
+          </p:cNvSpPr>
+          <p:nvPr>
+            <p:ph type="title"/>
+          </p:nvPr>
+        </p:nvSpPr>
+        <p:spPr>
+          <a:xfrm>
+            <a:off x="457200" y="2038350"/>
+            <a:ext cx="8229600" cy="857250"/>
+          </a:xfrm>
+        </p:spPr>
+        <p:txBody>
+          <a:bodyPr/>
+          <a:lstStyle/>
+          <a:p>
+            <a:r>
+              <a:rPr lang="en-IN" dirty="0" smtClean="0">
+                <a:solidFill>
+                  <a:schemeClr val="accent6">
+                    <a:lumMod val="75000"/>
+                  </a:schemeClr>
+                </a:solidFill>
+              </a:rPr>
+              <a:t>Hypothesis Testing</a:t>
+            </a:r>
+            <a:endParaRPr lang="en-IN" dirty="0">
+              <a:solidFill>
+                <a:schemeClr val="accent6">
+                  <a:lumMod val="75000"/>
+                </a:schemeClr>
+              </a:solidFill>
+            </a:endParaRPr>
+          </a:p>
+        </p:txBody>
+      </p:sp>
+    </p:spTree>
+    <p:extLst>
+      <p:ext uri="{BB962C8B-B14F-4D97-AF65-F5344CB8AC3E}">
+        <p14:creationId xmlns:p14="http://schemas.microsoft.com/office/powerpoint/2010/main" val="3834348325"/>
+      </p:ext>
+    </p:extLst>
+  </p:cSld>
+  <p:clrMapOvr>
+    <a:masterClrMapping/>
+  </p:clrMapOvr>
+  <p:timing>
+    <p:tnLst>
+      <p:par>
+        <p:cTn id="1" dur="indefinite" restart="never" nodeType="tmRoot"/>
+      </p:par>
+    </p:tnLst>
+  </p:timing>
+</p:sld>
+</file>
+
+<file path=ppt/slides/slide15.xml><?xml version="1.0" encoding="utf-8"?>
+<p:sld xmlns:a="http://schemas.openxmlformats.org/drawingml/2006/main" xmlns:r="http://schemas.openxmlformats.org/officeDocument/2006/relationships" xmlns:p="http://schemas.openxmlformats.org/presentationml/2006/main">
+  <p:cSld>
+    <p:spTree>
+      <p:nvGrpSpPr>
+        <p:cNvPr id="1" name=""/>
+        <p:cNvGrpSpPr/>
+        <p:nvPr/>
+      </p:nvGrpSpPr>
+      <p:grpSpPr>
+        <a:xfrm>
+          <a:off x="0" y="0"/>
+          <a:ext cx="0" cy="0"/>
+          <a:chOff x="0" y="0"/>
+          <a:chExt cx="0" cy="0"/>
+        </a:xfrm>
+      </p:grpSpPr>
+      <p:sp>
+        <p:nvSpPr>
+          <p:cNvPr id="2" name="Title 1"/>
+          <p:cNvSpPr>
+            <a:spLocks noGrp="1"/>
+          </p:cNvSpPr>
+          <p:nvPr>
+            <p:ph type="title"/>
+          </p:nvPr>
+        </p:nvSpPr>
+        <p:spPr/>
+        <p:txBody>
+          <a:bodyPr/>
+          <a:lstStyle/>
+          <a:p>
+            <a:r>
+              <a:rPr lang="en-IN" dirty="0">
+                <a:solidFill>
+                  <a:schemeClr val="accent6">
+                    <a:lumMod val="75000"/>
+                  </a:schemeClr>
+                </a:solidFill>
+              </a:rPr>
+              <a:t>Hypothesis 1: Age</a:t>
+            </a:r>
+          </a:p>
+        </p:txBody>
+      </p:sp>
+      <p:sp>
+        <p:nvSpPr>
+          <p:cNvPr id="3" name="Content Placeholder 2"/>
+          <p:cNvSpPr>
+            <a:spLocks noGrp="1"/>
+          </p:cNvSpPr>
+          <p:nvPr>
+            <p:ph idx="1"/>
+          </p:nvPr>
+        </p:nvSpPr>
+        <p:spPr/>
+        <p:txBody>
+          <a:bodyPr>
+            <a:normAutofit/>
+          </a:bodyPr>
+          <a:lstStyle/>
+          <a:p>
+            <a:r>
+              <a:rPr lang="en-IN" sz="1800" b="1" dirty="0" smtClean="0"/>
+              <a:t>Hypothesis</a:t>
+            </a:r>
+            <a:r>
+              <a:rPr lang="en-IN" sz="1800" dirty="0" smtClean="0"/>
+              <a:t> Null</a:t>
+            </a:r>
+            <a:r>
+              <a:rPr lang="en-IN" sz="1800" dirty="0"/>
+              <a:t>: Age of people who left the bank and who did not are similar. Alternative: </a:t>
+            </a:r>
+            <a:r>
+              <a:rPr lang="en-IN" sz="1800" dirty="0" smtClean="0"/>
+              <a:t>Not similar.</a:t>
+            </a:r>
+          </a:p>
+          <a:p>
+            <a:r>
+              <a:rPr lang="en-IN" sz="1800" dirty="0"/>
+              <a:t>We reject the Null hypothesis. The probability of the null hypothesis is almost zero which is </a:t>
+            </a:r>
+            <a:r>
+              <a:rPr lang="en-IN" sz="1800" dirty="0" smtClean="0"/>
+              <a:t>less than </a:t>
+            </a:r>
+            <a:r>
+              <a:rPr lang="en-IN" sz="1800" dirty="0"/>
+              <a:t>the significance level of 0.05.</a:t>
+            </a:r>
+            <a:endParaRPr lang="en-IN" sz="1800" dirty="0" smtClean="0"/>
+          </a:p>
+          <a:p>
+            <a:pPr marL="0" indent="0">
+              <a:buNone/>
+            </a:pPr>
+            <a:endParaRPr lang="en-IN" sz="1800" dirty="0"/>
+          </a:p>
+        </p:txBody>
+      </p:sp>
+      <p:pic>
+        <p:nvPicPr>
+          <p:cNvPr id="9218" name="Picture 2"/>
+          <p:cNvPicPr>
+            <a:picLocks noChangeAspect="1" noChangeArrowheads="1"/>
+          </p:cNvPicPr>
+          <p:nvPr/>
+        </p:nvPicPr>
+        <p:blipFill>
+          <a:blip r:embed="rId2" cstate="print">
+            <a:extLst>
+              <a:ext uri="{28A0092B-C50C-407E-A947-70E740481C1C}">
+                <a14:useLocalDpi xmlns:a14="http://schemas.microsoft.com/office/drawing/2010/main" val="0"/>
+              </a:ext>
+            </a:extLst>
+          </a:blip>
+          <a:srcRect/>
+          <a:stretch>
+            <a:fillRect/>
+          </a:stretch>
+        </p:blipFill>
+        <p:spPr bwMode="auto">
+          <a:xfrm>
+            <a:off x="2667000" y="2498123"/>
+            <a:ext cx="3810000" cy="2512027"/>
+          </a:xfrm>
+          <a:prstGeom prst="rect">
+            <a:avLst/>
+          </a:prstGeom>
+          <a:noFill/>
+          <a:ln>
+            <a:noFill/>
+          </a:ln>
+          <a:effectLst/>
+          <a:extLst>
+            <a:ext uri="{909E8E84-426E-40DD-AFC4-6F175D3DCCD1}">
+              <a14:hiddenFill xmlns:a14="http://schemas.microsoft.com/office/drawing/2010/main">
+                <a:solidFill>
+                  <a:schemeClr val="accent1"/>
+                </a:solidFill>
+              </a14:hiddenFill>
+            </a:ext>
+            <a:ext uri="{91240B29-F687-4F45-9708-019B960494DF}">
+              <a14:hiddenLine xmlns:a14="http://schemas.microsoft.com/office/drawing/2010/main" w="9525">
+                <a:solidFill>
+                  <a:schemeClr val="tx1"/>
+                </a:solidFill>
+                <a:miter lim="800000"/>
+                <a:headEnd/>
+                <a:tailEnd/>
+              </a14:hiddenLine>
+            </a:ext>
+            <a:ext uri="{AF507438-7753-43E0-B8FC-AC1667EBCBE1}">
+              <a14:hiddenEffects xmlns:a14="http://schemas.microsoft.com/office/drawing/2010/main">
+                <a:effectLst>
+                  <a:outerShdw dist="35921" dir="2700000" algn="ctr" rotWithShape="0">
+                    <a:schemeClr val="bg2"/>
+                  </a:outerShdw>
+                </a:effectLst>
+              </a14:hiddenEffects>
+            </a:ext>
+          </a:extLst>
+        </p:spPr>
+      </p:pic>
+    </p:spTree>
+    <p:extLst>
+      <p:ext uri="{BB962C8B-B14F-4D97-AF65-F5344CB8AC3E}">
+        <p14:creationId xmlns:p14="http://schemas.microsoft.com/office/powerpoint/2010/main" val="733636544"/>
+      </p:ext>
+    </p:extLst>
+  </p:cSld>
+  <p:clrMapOvr>
+    <a:masterClrMapping/>
+  </p:clrMapOvr>
+  <p:timing>
+    <p:tnLst>
+      <p:par>
+        <p:cTn id="1" dur="indefinite" restart="never" nodeType="tmRoot"/>
+      </p:par>
+    </p:tnLst>
+  </p:timing>
+</p:sld>
+</file>
+
+<file path=ppt/slides/slide16.xml><?xml version="1.0" encoding="utf-8"?>
+<p:sld xmlns:a="http://schemas.openxmlformats.org/drawingml/2006/main" xmlns:r="http://schemas.openxmlformats.org/officeDocument/2006/relationships" xmlns:p="http://schemas.openxmlformats.org/presentationml/2006/main">
+  <p:cSld>
+    <p:spTree>
+      <p:nvGrpSpPr>
+        <p:cNvPr id="1" name=""/>
+        <p:cNvGrpSpPr/>
+        <p:nvPr/>
+      </p:nvGrpSpPr>
+      <p:grpSpPr>
+        <a:xfrm>
+          <a:off x="0" y="0"/>
+          <a:ext cx="0" cy="0"/>
+          <a:chOff x="0" y="0"/>
+          <a:chExt cx="0" cy="0"/>
+        </a:xfrm>
+      </p:grpSpPr>
+      <p:sp>
+        <p:nvSpPr>
+          <p:cNvPr id="2" name="Title 1"/>
+          <p:cNvSpPr>
+            <a:spLocks noGrp="1"/>
+          </p:cNvSpPr>
+          <p:nvPr>
+            <p:ph type="title"/>
+          </p:nvPr>
+        </p:nvSpPr>
+        <p:spPr/>
+        <p:txBody>
+          <a:bodyPr/>
+          <a:lstStyle/>
+          <a:p>
+            <a:r>
+              <a:rPr lang="en-IN" dirty="0">
+                <a:solidFill>
+                  <a:schemeClr val="accent6">
+                    <a:lumMod val="75000"/>
+                  </a:schemeClr>
+                </a:solidFill>
+              </a:rPr>
+              <a:t>Hypothesis 2: Credit Score</a:t>
+            </a:r>
+          </a:p>
+        </p:txBody>
+      </p:sp>
+      <p:sp>
+        <p:nvSpPr>
+          <p:cNvPr id="3" name="Content Placeholder 2"/>
+          <p:cNvSpPr>
+            <a:spLocks noGrp="1"/>
+          </p:cNvSpPr>
+          <p:nvPr>
+            <p:ph idx="1"/>
+          </p:nvPr>
+        </p:nvSpPr>
+        <p:spPr/>
+        <p:txBody>
+          <a:bodyPr>
+            <a:normAutofit/>
+          </a:bodyPr>
+          <a:lstStyle/>
+          <a:p>
+            <a:r>
+              <a:rPr lang="en-IN" sz="1800" b="1" dirty="0" smtClean="0"/>
+              <a:t>Hypothesis </a:t>
+            </a:r>
+            <a:r>
+              <a:rPr lang="en-IN" sz="1800" dirty="0" smtClean="0"/>
+              <a:t>Null</a:t>
+            </a:r>
+            <a:r>
+              <a:rPr lang="en-IN" sz="1800" dirty="0"/>
+              <a:t>: Credit score of people who left the bank and who did not are similar. </a:t>
+            </a:r>
+            <a:r>
+              <a:rPr lang="en-IN" sz="1800" dirty="0" smtClean="0"/>
+              <a:t>Alternative: Not </a:t>
+            </a:r>
+            <a:r>
+              <a:rPr lang="en-IN" sz="1800" dirty="0"/>
+              <a:t>similar</a:t>
+            </a:r>
+            <a:r>
+              <a:rPr lang="en-IN" sz="1800" dirty="0" smtClean="0"/>
+              <a:t>.</a:t>
+            </a:r>
+          </a:p>
+          <a:p>
+            <a:r>
+              <a:rPr lang="en-IN" sz="1800" dirty="0"/>
+              <a:t>We reject the Null hypothesis. The probability of the null hypothesis is 0.0085 or 0.85 % which is </a:t>
+            </a:r>
+            <a:r>
+              <a:rPr lang="en-IN" sz="1800" dirty="0" smtClean="0"/>
+              <a:t>less than </a:t>
+            </a:r>
+            <a:r>
+              <a:rPr lang="en-IN" sz="1800" dirty="0"/>
+              <a:t>the significance level of 0.05</a:t>
+            </a:r>
+            <a:endParaRPr lang="en-IN" sz="1800" dirty="0" smtClean="0"/>
+          </a:p>
+          <a:p>
+            <a:endParaRPr lang="en-IN" sz="1800" dirty="0"/>
+          </a:p>
+        </p:txBody>
+      </p:sp>
+      <p:pic>
+        <p:nvPicPr>
+          <p:cNvPr id="10242" name="Picture 2"/>
+          <p:cNvPicPr>
+            <a:picLocks noChangeAspect="1" noChangeArrowheads="1"/>
+          </p:cNvPicPr>
+          <p:nvPr/>
+        </p:nvPicPr>
+        <p:blipFill>
+          <a:blip r:embed="rId2" cstate="print">
+            <a:extLst>
+              <a:ext uri="{28A0092B-C50C-407E-A947-70E740481C1C}">
+                <a14:useLocalDpi xmlns:a14="http://schemas.microsoft.com/office/drawing/2010/main" val="0"/>
+              </a:ext>
+            </a:extLst>
+          </a:blip>
+          <a:srcRect/>
+          <a:stretch>
+            <a:fillRect/>
+          </a:stretch>
+        </p:blipFill>
+        <p:spPr bwMode="auto">
+          <a:xfrm>
+            <a:off x="2514600" y="2561476"/>
+            <a:ext cx="3657600" cy="2409444"/>
+          </a:xfrm>
+          <a:prstGeom prst="rect">
+            <a:avLst/>
+          </a:prstGeom>
+          <a:noFill/>
+          <a:ln>
+            <a:noFill/>
+          </a:ln>
+          <a:effectLst/>
+          <a:extLst>
+            <a:ext uri="{909E8E84-426E-40DD-AFC4-6F175D3DCCD1}">
+              <a14:hiddenFill xmlns:a14="http://schemas.microsoft.com/office/drawing/2010/main">
+                <a:solidFill>
+                  <a:schemeClr val="accent1"/>
+                </a:solidFill>
+              </a14:hiddenFill>
+            </a:ext>
+            <a:ext uri="{91240B29-F687-4F45-9708-019B960494DF}">
+              <a14:hiddenLine xmlns:a14="http://schemas.microsoft.com/office/drawing/2010/main" w="9525">
+                <a:solidFill>
+                  <a:schemeClr val="tx1"/>
+                </a:solidFill>
+                <a:miter lim="800000"/>
+                <a:headEnd/>
+                <a:tailEnd/>
+              </a14:hiddenLine>
+            </a:ext>
+            <a:ext uri="{AF507438-7753-43E0-B8FC-AC1667EBCBE1}">
+              <a14:hiddenEffects xmlns:a14="http://schemas.microsoft.com/office/drawing/2010/main">
+                <a:effectLst>
+                  <a:outerShdw dist="35921" dir="2700000" algn="ctr" rotWithShape="0">
+                    <a:schemeClr val="bg2"/>
+                  </a:outerShdw>
+                </a:effectLst>
+              </a14:hiddenEffects>
+            </a:ext>
+          </a:extLst>
+        </p:spPr>
+      </p:pic>
+    </p:spTree>
+    <p:extLst>
+      <p:ext uri="{BB962C8B-B14F-4D97-AF65-F5344CB8AC3E}">
+        <p14:creationId xmlns:p14="http://schemas.microsoft.com/office/powerpoint/2010/main" val="1745329438"/>
+      </p:ext>
+    </p:extLst>
+  </p:cSld>
+  <p:clrMapOvr>
+    <a:masterClrMapping/>
+  </p:clrMapOvr>
+  <p:timing>
+    <p:tnLst>
+      <p:par>
+        <p:cTn id="1" dur="indefinite" restart="never" nodeType="tmRoot"/>
+      </p:par>
+    </p:tnLst>
+  </p:timing>
+</p:sld>
+</file>
+
+<file path=ppt/slides/slide17.xml><?xml version="1.0" encoding="utf-8"?>
+<p:sld xmlns:a="http://schemas.openxmlformats.org/drawingml/2006/main" xmlns:r="http://schemas.openxmlformats.org/officeDocument/2006/relationships" xmlns:p="http://schemas.openxmlformats.org/presentationml/2006/main">
+  <p:cSld>
+    <p:spTree>
+      <p:nvGrpSpPr>
+        <p:cNvPr id="1" name=""/>
+        <p:cNvGrpSpPr/>
+        <p:nvPr/>
+      </p:nvGrpSpPr>
+      <p:grpSpPr>
+        <a:xfrm>
+          <a:off x="0" y="0"/>
+          <a:ext cx="0" cy="0"/>
+          <a:chOff x="0" y="0"/>
+          <a:chExt cx="0" cy="0"/>
+        </a:xfrm>
+      </p:grpSpPr>
+      <p:sp>
+        <p:nvSpPr>
+          <p:cNvPr id="2" name="Title 1"/>
+          <p:cNvSpPr>
+            <a:spLocks noGrp="1"/>
+          </p:cNvSpPr>
+          <p:nvPr>
+            <p:ph type="title"/>
+          </p:nvPr>
+        </p:nvSpPr>
+        <p:spPr/>
+        <p:txBody>
+          <a:bodyPr/>
+          <a:lstStyle/>
+          <a:p>
+            <a:r>
+              <a:rPr lang="en-IN" dirty="0">
+                <a:solidFill>
+                  <a:schemeClr val="accent6">
+                    <a:lumMod val="75000"/>
+                  </a:schemeClr>
+                </a:solidFill>
+              </a:rPr>
+              <a:t>Hypothesis 3: Balance</a:t>
+            </a:r>
+          </a:p>
+        </p:txBody>
+      </p:sp>
+      <p:sp>
+        <p:nvSpPr>
+          <p:cNvPr id="3" name="Content Placeholder 2"/>
+          <p:cNvSpPr>
+            <a:spLocks noGrp="1"/>
+          </p:cNvSpPr>
+          <p:nvPr>
+            <p:ph idx="1"/>
+          </p:nvPr>
+        </p:nvSpPr>
+        <p:spPr/>
+        <p:txBody>
+          <a:bodyPr>
+            <a:normAutofit/>
+          </a:bodyPr>
+          <a:lstStyle/>
+          <a:p>
+            <a:r>
+              <a:rPr lang="en-IN" sz="1800" b="1" dirty="0" smtClean="0"/>
+              <a:t>Hypothesis </a:t>
+            </a:r>
+            <a:r>
+              <a:rPr lang="en-IN" sz="1800" dirty="0" smtClean="0"/>
+              <a:t>Null</a:t>
+            </a:r>
+            <a:r>
+              <a:rPr lang="en-IN" sz="1800" dirty="0"/>
+              <a:t>: Balance of people who left the bank and who did not are similar. Alternative: </a:t>
+            </a:r>
+            <a:r>
+              <a:rPr lang="en-IN" sz="1800" dirty="0" smtClean="0"/>
+              <a:t>Not similar.</a:t>
+            </a:r>
+          </a:p>
+          <a:p>
+            <a:r>
+              <a:rPr lang="en-IN" sz="1800" dirty="0"/>
+              <a:t>The Balances of Zero are too many in the data. When we consider all the data, we reject the </a:t>
+            </a:r>
+            <a:r>
+              <a:rPr lang="en-IN" sz="1800" dirty="0" smtClean="0"/>
+              <a:t>Null Hypothesis</a:t>
+            </a:r>
+            <a:r>
+              <a:rPr lang="en-IN" sz="1800" dirty="0"/>
+              <a:t>. When we only remove the Balances which are Zero, the probability of the </a:t>
+            </a:r>
+            <a:r>
+              <a:rPr lang="en-IN" sz="1800" dirty="0" smtClean="0"/>
+              <a:t>null hypothesis </a:t>
+            </a:r>
+            <a:r>
+              <a:rPr lang="en-IN" sz="1800" dirty="0"/>
+              <a:t>becomes 19.06% which is </a:t>
+            </a:r>
+            <a:r>
+              <a:rPr lang="en-IN" sz="1800" dirty="0" smtClean="0"/>
+              <a:t>significant. Then </a:t>
+            </a:r>
+            <a:r>
+              <a:rPr lang="en-IN" sz="1800" dirty="0"/>
+              <a:t>we reject Alternative Hypothesis.</a:t>
+            </a:r>
+            <a:endParaRPr lang="en-IN" sz="1800" dirty="0" smtClean="0"/>
+          </a:p>
+          <a:p>
+            <a:endParaRPr lang="en-IN" sz="1800" dirty="0"/>
+          </a:p>
+        </p:txBody>
+      </p:sp>
+      <p:pic>
+        <p:nvPicPr>
+          <p:cNvPr id="11266" name="Picture 2"/>
+          <p:cNvPicPr>
+            <a:picLocks noChangeAspect="1" noChangeArrowheads="1"/>
+          </p:cNvPicPr>
+          <p:nvPr/>
+        </p:nvPicPr>
+        <p:blipFill>
+          <a:blip r:embed="rId2" cstate="print">
+            <a:extLst>
+              <a:ext uri="{28A0092B-C50C-407E-A947-70E740481C1C}">
+                <a14:useLocalDpi xmlns:a14="http://schemas.microsoft.com/office/drawing/2010/main" val="0"/>
+              </a:ext>
+            </a:extLst>
+          </a:blip>
+          <a:srcRect/>
+          <a:stretch>
+            <a:fillRect/>
+          </a:stretch>
+        </p:blipFill>
+        <p:spPr bwMode="auto">
+          <a:xfrm>
+            <a:off x="1066800" y="2952750"/>
+            <a:ext cx="3581400" cy="2110836"/>
+          </a:xfrm>
+          <a:prstGeom prst="rect">
+            <a:avLst/>
+          </a:prstGeom>
+          <a:noFill/>
+          <a:ln>
+            <a:noFill/>
+          </a:ln>
+          <a:effectLst/>
+          <a:extLst>
+            <a:ext uri="{909E8E84-426E-40DD-AFC4-6F175D3DCCD1}">
+              <a14:hiddenFill xmlns:a14="http://schemas.microsoft.com/office/drawing/2010/main">
+                <a:solidFill>
+                  <a:schemeClr val="accent1"/>
+                </a:solidFill>
+              </a14:hiddenFill>
+            </a:ext>
+            <a:ext uri="{91240B29-F687-4F45-9708-019B960494DF}">
+              <a14:hiddenLine xmlns:a14="http://schemas.microsoft.com/office/drawing/2010/main" w="9525">
+                <a:solidFill>
+                  <a:schemeClr val="tx1"/>
+                </a:solidFill>
+                <a:miter lim="800000"/>
+                <a:headEnd/>
+                <a:tailEnd/>
+              </a14:hiddenLine>
+            </a:ext>
+            <a:ext uri="{AF507438-7753-43E0-B8FC-AC1667EBCBE1}">
+              <a14:hiddenEffects xmlns:a14="http://schemas.microsoft.com/office/drawing/2010/main">
+                <a:effectLst>
+                  <a:outerShdw dist="35921" dir="2700000" algn="ctr" rotWithShape="0">
+                    <a:schemeClr val="bg2"/>
+                  </a:outerShdw>
+                </a:effectLst>
+              </a14:hiddenEffects>
+            </a:ext>
+          </a:extLst>
+        </p:spPr>
+      </p:pic>
+      <p:pic>
+        <p:nvPicPr>
+          <p:cNvPr id="11267" name="Picture 3"/>
+          <p:cNvPicPr>
+            <a:picLocks noChangeAspect="1" noChangeArrowheads="1"/>
+          </p:cNvPicPr>
+          <p:nvPr/>
+        </p:nvPicPr>
+        <p:blipFill>
+          <a:blip r:embed="rId3" cstate="print">
+            <a:extLst>
+              <a:ext uri="{28A0092B-C50C-407E-A947-70E740481C1C}">
+                <a14:useLocalDpi xmlns:a14="http://schemas.microsoft.com/office/drawing/2010/main" val="0"/>
+              </a:ext>
+            </a:extLst>
+          </a:blip>
+          <a:srcRect/>
+          <a:stretch>
+            <a:fillRect/>
+          </a:stretch>
+        </p:blipFill>
+        <p:spPr bwMode="auto">
+          <a:xfrm>
+            <a:off x="4800600" y="2876549"/>
+            <a:ext cx="3733800" cy="2187181"/>
+          </a:xfrm>
+          <a:prstGeom prst="rect">
+            <a:avLst/>
+          </a:prstGeom>
+          <a:noFill/>
+          <a:ln>
+            <a:noFill/>
+          </a:ln>
+          <a:effectLst/>
+          <a:extLst>
+            <a:ext uri="{909E8E84-426E-40DD-AFC4-6F175D3DCCD1}">
+              <a14:hiddenFill xmlns:a14="http://schemas.microsoft.com/office/drawing/2010/main">
+                <a:solidFill>
+                  <a:schemeClr val="accent1"/>
+                </a:solidFill>
+              </a14:hiddenFill>
+            </a:ext>
+            <a:ext uri="{91240B29-F687-4F45-9708-019B960494DF}">
+              <a14:hiddenLine xmlns:a14="http://schemas.microsoft.com/office/drawing/2010/main" w="9525">
+                <a:solidFill>
+                  <a:schemeClr val="tx1"/>
+                </a:solidFill>
+                <a:miter lim="800000"/>
+                <a:headEnd/>
+                <a:tailEnd/>
+              </a14:hiddenLine>
+            </a:ext>
+            <a:ext uri="{AF507438-7753-43E0-B8FC-AC1667EBCBE1}">
+              <a14:hiddenEffects xmlns:a14="http://schemas.microsoft.com/office/drawing/2010/main">
+                <a:effectLst>
+                  <a:outerShdw dist="35921" dir="2700000" algn="ctr" rotWithShape="0">
+                    <a:schemeClr val="bg2"/>
+                  </a:outerShdw>
+                </a:effectLst>
+              </a14:hiddenEffects>
+            </a:ext>
+          </a:extLst>
+        </p:spPr>
+      </p:pic>
+    </p:spTree>
+    <p:extLst>
+      <p:ext uri="{BB962C8B-B14F-4D97-AF65-F5344CB8AC3E}">
+        <p14:creationId xmlns:p14="http://schemas.microsoft.com/office/powerpoint/2010/main" val="123576508"/>
+      </p:ext>
+    </p:extLst>
+  </p:cSld>
+  <p:clrMapOvr>
+    <a:masterClrMapping/>
+  </p:clrMapOvr>
+  <p:timing>
+    <p:tnLst>
+      <p:par>
+        <p:cTn id="1" dur="indefinite" restart="never" nodeType="tmRoot"/>
+      </p:par>
+    </p:tnLst>
+  </p:timing>
+</p:sld>
+</file>
+
+<file path=ppt/slides/slide18.xml><?xml version="1.0" encoding="utf-8"?>
+<p:sld xmlns:a="http://schemas.openxmlformats.org/drawingml/2006/main" xmlns:r="http://schemas.openxmlformats.org/officeDocument/2006/relationships" xmlns:p="http://schemas.openxmlformats.org/presentationml/2006/main">
+  <p:cSld>
+    <p:spTree>
+      <p:nvGrpSpPr>
+        <p:cNvPr id="1" name=""/>
+        <p:cNvGrpSpPr/>
+        <p:nvPr/>
+      </p:nvGrpSpPr>
+      <p:grpSpPr>
+        <a:xfrm>
+          <a:off x="0" y="0"/>
+          <a:ext cx="0" cy="0"/>
+          <a:chOff x="0" y="0"/>
+          <a:chExt cx="0" cy="0"/>
+        </a:xfrm>
+      </p:grpSpPr>
+      <p:sp>
+        <p:nvSpPr>
+          <p:cNvPr id="2" name="Title 1"/>
+          <p:cNvSpPr>
+            <a:spLocks noGrp="1"/>
+          </p:cNvSpPr>
+          <p:nvPr>
+            <p:ph type="title"/>
+          </p:nvPr>
+        </p:nvSpPr>
+        <p:spPr/>
+        <p:txBody>
+          <a:bodyPr/>
+          <a:lstStyle/>
+          <a:p>
+            <a:r>
+              <a:rPr lang="en-IN" dirty="0">
+                <a:solidFill>
+                  <a:schemeClr val="accent6">
+                    <a:lumMod val="75000"/>
+                  </a:schemeClr>
+                </a:solidFill>
+              </a:rPr>
+              <a:t>Hypothesis 4: Estimated Salary</a:t>
+            </a:r>
+          </a:p>
+        </p:txBody>
+      </p:sp>
+      <p:sp>
+        <p:nvSpPr>
+          <p:cNvPr id="3" name="Content Placeholder 2"/>
+          <p:cNvSpPr>
+            <a:spLocks noGrp="1"/>
+          </p:cNvSpPr>
+          <p:nvPr>
+            <p:ph idx="1"/>
+          </p:nvPr>
+        </p:nvSpPr>
+        <p:spPr/>
+        <p:txBody>
+          <a:bodyPr>
+            <a:normAutofit/>
+          </a:bodyPr>
+          <a:lstStyle/>
+          <a:p>
+            <a:r>
+              <a:rPr lang="en-IN" sz="1800" b="1" dirty="0" smtClean="0"/>
+              <a:t>Hypothesis </a:t>
+            </a:r>
+            <a:r>
+              <a:rPr lang="en-IN" sz="1800" dirty="0" smtClean="0"/>
+              <a:t>Null</a:t>
+            </a:r>
+            <a:r>
+              <a:rPr lang="en-IN" sz="1800" dirty="0"/>
+              <a:t>: Estimated Salary of people who left the bank and who did not are </a:t>
+            </a:r>
+            <a:r>
+              <a:rPr lang="en-IN" sz="1800" dirty="0" smtClean="0"/>
+              <a:t>similar. Alternative</a:t>
+            </a:r>
+            <a:r>
+              <a:rPr lang="en-IN" sz="1800" dirty="0"/>
+              <a:t>: Not similar</a:t>
+            </a:r>
+            <a:r>
+              <a:rPr lang="en-IN" sz="1800" dirty="0" smtClean="0"/>
+              <a:t>.</a:t>
+            </a:r>
+          </a:p>
+          <a:p>
+            <a:r>
+              <a:rPr lang="en-IN" sz="1800" dirty="0"/>
+              <a:t>We do not reject the Null hypothesis. The probability of the null hypothesis using the t-test is </a:t>
+            </a:r>
+            <a:r>
+              <a:rPr lang="en-IN" sz="1800" dirty="0" smtClean="0"/>
+              <a:t>0.2416 or </a:t>
+            </a:r>
+            <a:r>
+              <a:rPr lang="en-IN" sz="1800" dirty="0"/>
+              <a:t>24.16% and using bootstrapping is 0.1222 or 12.22% which is more than the significance level </a:t>
+            </a:r>
+            <a:r>
+              <a:rPr lang="en-IN" sz="1800" dirty="0" smtClean="0"/>
+              <a:t>of 0.05</a:t>
+            </a:r>
+          </a:p>
+          <a:p>
+            <a:endParaRPr lang="en-IN" sz="1800" dirty="0"/>
+          </a:p>
+        </p:txBody>
+      </p:sp>
+      <p:pic>
+        <p:nvPicPr>
+          <p:cNvPr id="12290" name="Picture 2"/>
+          <p:cNvPicPr>
+            <a:picLocks noChangeAspect="1" noChangeArrowheads="1"/>
+          </p:cNvPicPr>
+          <p:nvPr/>
+        </p:nvPicPr>
+        <p:blipFill>
+          <a:blip r:embed="rId2" cstate="print">
+            <a:extLst>
+              <a:ext uri="{28A0092B-C50C-407E-A947-70E740481C1C}">
+                <a14:useLocalDpi xmlns:a14="http://schemas.microsoft.com/office/drawing/2010/main" val="0"/>
+              </a:ext>
+            </a:extLst>
+          </a:blip>
+          <a:srcRect/>
+          <a:stretch>
+            <a:fillRect/>
+          </a:stretch>
+        </p:blipFill>
+        <p:spPr bwMode="auto">
+          <a:xfrm>
+            <a:off x="2590800" y="2647950"/>
+            <a:ext cx="3810000" cy="2382468"/>
+          </a:xfrm>
+          <a:prstGeom prst="rect">
+            <a:avLst/>
+          </a:prstGeom>
+          <a:noFill/>
+          <a:ln>
+            <a:noFill/>
+          </a:ln>
+          <a:effectLst/>
+          <a:extLst>
+            <a:ext uri="{909E8E84-426E-40DD-AFC4-6F175D3DCCD1}">
+              <a14:hiddenFill xmlns:a14="http://schemas.microsoft.com/office/drawing/2010/main">
+                <a:solidFill>
+                  <a:schemeClr val="accent1"/>
+                </a:solidFill>
+              </a14:hiddenFill>
+            </a:ext>
+            <a:ext uri="{91240B29-F687-4F45-9708-019B960494DF}">
+              <a14:hiddenLine xmlns:a14="http://schemas.microsoft.com/office/drawing/2010/main" w="9525">
+                <a:solidFill>
+                  <a:schemeClr val="tx1"/>
+                </a:solidFill>
+                <a:miter lim="800000"/>
+                <a:headEnd/>
+                <a:tailEnd/>
+              </a14:hiddenLine>
+            </a:ext>
+            <a:ext uri="{AF507438-7753-43E0-B8FC-AC1667EBCBE1}">
+              <a14:hiddenEffects xmlns:a14="http://schemas.microsoft.com/office/drawing/2010/main">
+                <a:effectLst>
+                  <a:outerShdw dist="35921" dir="2700000" algn="ctr" rotWithShape="0">
+                    <a:schemeClr val="bg2"/>
+                  </a:outerShdw>
+                </a:effectLst>
+              </a14:hiddenEffects>
+            </a:ext>
+          </a:extLst>
+        </p:spPr>
+      </p:pic>
+    </p:spTree>
+    <p:extLst>
+      <p:ext uri="{BB962C8B-B14F-4D97-AF65-F5344CB8AC3E}">
+        <p14:creationId xmlns:p14="http://schemas.microsoft.com/office/powerpoint/2010/main" val="3637766797"/>
+      </p:ext>
+    </p:extLst>
+  </p:cSld>
+  <p:clrMapOvr>
+    <a:masterClrMapping/>
+  </p:clrMapOvr>
+  <p:timing>
+    <p:tnLst>
+      <p:par>
+        <p:cTn id="1" dur="indefinite" restart="never" nodeType="tmRoot"/>
+      </p:par>
+    </p:tnLst>
+  </p:timing>
+</p:sld>
+</file>
+
+<file path=ppt/slides/slide19.xml><?xml version="1.0" encoding="utf-8"?>
+<p:sld xmlns:a="http://schemas.openxmlformats.org/drawingml/2006/main" xmlns:r="http://schemas.openxmlformats.org/officeDocument/2006/relationships" xmlns:p="http://schemas.openxmlformats.org/presentationml/2006/main">
+  <p:cSld>
+    <p:spTree>
+      <p:nvGrpSpPr>
+        <p:cNvPr id="1" name=""/>
+        <p:cNvGrpSpPr/>
+        <p:nvPr/>
+      </p:nvGrpSpPr>
+      <p:grpSpPr>
+        <a:xfrm>
+          <a:off x="0" y="0"/>
+          <a:ext cx="0" cy="0"/>
+          <a:chOff x="0" y="0"/>
+          <a:chExt cx="0" cy="0"/>
+        </a:xfrm>
+      </p:grpSpPr>
+      <p:sp>
+        <p:nvSpPr>
+          <p:cNvPr id="2" name="Title 1"/>
+          <p:cNvSpPr>
+            <a:spLocks noGrp="1"/>
+          </p:cNvSpPr>
+          <p:nvPr>
+            <p:ph type="title"/>
+          </p:nvPr>
+        </p:nvSpPr>
+        <p:spPr/>
+        <p:txBody>
+          <a:bodyPr/>
+          <a:lstStyle/>
+          <a:p>
+            <a:r>
+              <a:rPr lang="en-IN" dirty="0" smtClean="0">
+                <a:solidFill>
+                  <a:schemeClr val="accent6">
+                    <a:lumMod val="75000"/>
+                  </a:schemeClr>
+                </a:solidFill>
+              </a:rPr>
+              <a:t>Data Pre-processing</a:t>
+            </a:r>
+            <a:endParaRPr lang="en-IN" dirty="0">
+              <a:solidFill>
+                <a:schemeClr val="accent6">
+                  <a:lumMod val="75000"/>
+                </a:schemeClr>
+              </a:solidFill>
+            </a:endParaRPr>
+          </a:p>
+        </p:txBody>
+      </p:sp>
+      <p:sp>
+        <p:nvSpPr>
+          <p:cNvPr id="3" name="Content Placeholder 2"/>
+          <p:cNvSpPr>
+            <a:spLocks noGrp="1"/>
+          </p:cNvSpPr>
+          <p:nvPr>
+            <p:ph idx="1"/>
+          </p:nvPr>
+        </p:nvSpPr>
+        <p:spPr/>
+        <p:txBody>
+          <a:bodyPr/>
+          <a:lstStyle/>
+          <a:p>
+            <a:r>
+              <a:rPr lang="en-IN" dirty="0" smtClean="0"/>
+              <a:t>Dropping </a:t>
+            </a:r>
+            <a:r>
+              <a:rPr lang="en-IN" dirty="0"/>
+              <a:t>insignificant </a:t>
+            </a:r>
+            <a:r>
+              <a:rPr lang="en-IN" dirty="0" smtClean="0"/>
+              <a:t>features</a:t>
+            </a:r>
+          </a:p>
+          <a:p>
+            <a:r>
+              <a:rPr lang="en-IN" dirty="0" smtClean="0"/>
+              <a:t>Label encoding</a:t>
+            </a:r>
+          </a:p>
+          <a:p>
+            <a:r>
+              <a:rPr lang="en-IN" dirty="0" smtClean="0"/>
+              <a:t>Scaling</a:t>
+            </a:r>
+          </a:p>
+          <a:p>
+            <a:r>
+              <a:rPr lang="en-IN" dirty="0" smtClean="0"/>
+              <a:t>Over Sampling</a:t>
+            </a:r>
+          </a:p>
+          <a:p>
+            <a:r>
+              <a:rPr lang="en-IN" dirty="0" smtClean="0"/>
+              <a:t>Data </a:t>
+            </a:r>
+            <a:r>
+              <a:rPr lang="en-IN" dirty="0"/>
+              <a:t>splitting</a:t>
+            </a:r>
+          </a:p>
+        </p:txBody>
+      </p:sp>
+    </p:spTree>
+    <p:extLst>
+      <p:ext uri="{BB962C8B-B14F-4D97-AF65-F5344CB8AC3E}">
+        <p14:creationId xmlns:p14="http://schemas.microsoft.com/office/powerpoint/2010/main" val="1803285979"/>
+      </p:ext>
+    </p:extLst>
+  </p:cSld>
+  <p:clrMapOvr>
+    <a:masterClrMapping/>
+  </p:clrMapOvr>
+  <p:timing>
+    <p:tnLst>
+      <p:par>
+        <p:cTn id="1" dur="indefinite" restart="never" nodeType="tmRoot"/>
+      </p:par>
+    </p:tnLst>
+  </p:timing>
 </p:sld>
 </file>
 
@@ -3393,10 +5425,28 @@
         </p:nvSpPr>
         <p:spPr/>
         <p:txBody>
-          <a:bodyPr/>
-          <a:lstStyle/>
-          <a:p>
-            <a:endParaRPr lang="en-IN" dirty="0"/>
+          <a:bodyPr>
+            <a:normAutofit/>
+          </a:bodyPr>
+          <a:lstStyle/>
+          <a:p>
+            <a:r>
+              <a:rPr lang="en-IN" dirty="0" smtClean="0">
+                <a:solidFill>
+                  <a:schemeClr val="accent6">
+                    <a:lumMod val="75000"/>
+                  </a:schemeClr>
+                </a:solidFill>
+              </a:rPr>
+              <a:t>What Is Churn Rate?</a:t>
+            </a:r>
+            <a:endParaRPr lang="en-IN" dirty="0">
+              <a:solidFill>
+                <a:schemeClr val="accent6">
+                  <a:lumMod val="75000"/>
+                </a:schemeClr>
+              </a:solidFill>
+            </a:endParaRPr>
           </a:p>
         </p:txBody>
       </p:sp>
@@ -3410,12 +5460,40 @@
             <p:ph idx="1"/>
           </p:nvPr>
         </p:nvSpPr>
-        <p:spPr/>
-        <p:txBody>
-          <a:bodyPr/>
-          <a:lstStyle/>
-          <a:p>
-            <a:endParaRPr lang="en-IN" dirty="0"/>
+        <p:spPr>
+          <a:xfrm>
+            <a:off x="457200" y="1387078"/>
+            <a:ext cx="8229600" cy="3394472"/>
+          </a:xfrm>
+        </p:spPr>
+        <p:txBody>
+          <a:bodyPr>
+            <a:normAutofit/>
+          </a:bodyPr>
+          <a:lstStyle/>
+          <a:p>
+            <a:r>
+              <a:rPr lang="en-IN" sz="2400" dirty="0" smtClean="0"/>
+              <a:t>The </a:t>
+            </a:r>
+            <a:r>
+              <a:rPr lang="en-IN" sz="2400" dirty="0"/>
+              <a:t>churn rate, also known as the rate of attrition or customer churn, is the rate at which customers stop doing business with an </a:t>
+            </a:r>
+            <a:r>
+              <a:rPr lang="en-IN" sz="2400" dirty="0" smtClean="0"/>
+              <a:t>entity.</a:t>
+            </a:r>
+          </a:p>
+          <a:p>
+            <a:r>
+              <a:rPr lang="en-IN" sz="2400" dirty="0" smtClean="0"/>
+              <a:t>Churn </a:t>
+            </a:r>
+            <a:r>
+              <a:rPr lang="en-IN" sz="2400" dirty="0"/>
+              <a:t>rate usually lies in the range from 10% up to 30%. </a:t>
+            </a:r>
           </a:p>
         </p:txBody>
       </p:sp>
@@ -3429,6 +5507,581 @@
   <p:clrMapOvr>
     <a:masterClrMapping/>
   </p:clrMapOvr>
+  <p:timing>
+    <p:tnLst>
+      <p:par>
+        <p:cTn id="1" dur="indefinite" restart="never" nodeType="tmRoot"/>
+      </p:par>
+    </p:tnLst>
+  </p:timing>
+</p:sld>
+</file>
+
+<file path=ppt/slides/slide20.xml><?xml version="1.0" encoding="utf-8"?>
+<p:sld xmlns:a="http://schemas.openxmlformats.org/drawingml/2006/main" xmlns:r="http://schemas.openxmlformats.org/officeDocument/2006/relationships" xmlns:p="http://schemas.openxmlformats.org/presentationml/2006/main">
+  <p:cSld>
+    <p:spTree>
+      <p:nvGrpSpPr>
+        <p:cNvPr id="1" name=""/>
+        <p:cNvGrpSpPr/>
+        <p:nvPr/>
+      </p:nvGrpSpPr>
+      <p:grpSpPr>
+        <a:xfrm>
+          <a:off x="0" y="0"/>
+          <a:ext cx="0" cy="0"/>
+          <a:chOff x="0" y="0"/>
+          <a:chExt cx="0" cy="0"/>
+        </a:xfrm>
+      </p:grpSpPr>
+      <p:sp>
+        <p:nvSpPr>
+          <p:cNvPr id="2" name="Title 1"/>
+          <p:cNvSpPr>
+            <a:spLocks noGrp="1"/>
+          </p:cNvSpPr>
+          <p:nvPr>
+            <p:ph type="title"/>
+          </p:nvPr>
+        </p:nvSpPr>
+        <p:spPr/>
+        <p:txBody>
+          <a:bodyPr/>
+          <a:lstStyle/>
+          <a:p>
+            <a:r>
+              <a:rPr lang="en-IN" dirty="0" smtClean="0">
+                <a:solidFill>
+                  <a:schemeClr val="accent6">
+                    <a:lumMod val="75000"/>
+                  </a:schemeClr>
+                </a:solidFill>
+              </a:rPr>
+              <a:t>Best Classifier: </a:t>
+            </a:r>
+            <a:r>
+              <a:rPr lang="en-IN" dirty="0" err="1" smtClean="0">
+                <a:solidFill>
+                  <a:schemeClr val="accent6">
+                    <a:lumMod val="75000"/>
+                  </a:schemeClr>
+                </a:solidFill>
+              </a:rPr>
+              <a:t>XGBoost</a:t>
+            </a:r>
+            <a:endParaRPr lang="en-IN" dirty="0">
+              <a:solidFill>
+                <a:schemeClr val="accent6">
+                  <a:lumMod val="75000"/>
+                </a:schemeClr>
+              </a:solidFill>
+            </a:endParaRPr>
+          </a:p>
+        </p:txBody>
+      </p:sp>
+      <p:sp>
+        <p:nvSpPr>
+          <p:cNvPr id="3" name="Content Placeholder 2"/>
+          <p:cNvSpPr>
+            <a:spLocks noGrp="1"/>
+          </p:cNvSpPr>
+          <p:nvPr>
+            <p:ph idx="1"/>
+          </p:nvPr>
+        </p:nvSpPr>
+        <p:spPr/>
+        <p:txBody>
+          <a:bodyPr>
+            <a:normAutofit/>
+          </a:bodyPr>
+          <a:lstStyle/>
+          <a:p>
+            <a:r>
+              <a:rPr lang="en-IN" sz="2400" dirty="0" smtClean="0"/>
+              <a:t>Training Accuracy: 0.8885</a:t>
+            </a:r>
+          </a:p>
+          <a:p>
+            <a:r>
+              <a:rPr lang="en-IN" sz="2400" dirty="0"/>
+              <a:t>Roc </a:t>
+            </a:r>
+            <a:r>
+              <a:rPr lang="en-IN" sz="2400" dirty="0" err="1"/>
+              <a:t>Auc</a:t>
+            </a:r>
+            <a:r>
+              <a:rPr lang="en-IN" sz="2400" dirty="0"/>
+              <a:t> Score: </a:t>
+            </a:r>
+            <a:r>
+              <a:rPr lang="en-IN" sz="2400" dirty="0" smtClean="0"/>
+              <a:t>0.9532</a:t>
+            </a:r>
+          </a:p>
+          <a:p>
+            <a:r>
+              <a:rPr lang="en-IN" sz="2400" dirty="0"/>
+              <a:t>Classification Report</a:t>
+            </a:r>
+            <a:r>
+              <a:rPr lang="en-IN" sz="2400" dirty="0" smtClean="0"/>
+              <a:t>:</a:t>
+            </a:r>
+          </a:p>
+          <a:p>
+            <a:endParaRPr lang="en-IN" sz="2400" dirty="0"/>
+          </a:p>
+        </p:txBody>
+      </p:sp>
+      <p:pic>
+        <p:nvPicPr>
+          <p:cNvPr id="13315" name="Picture 3"/>
+          <p:cNvPicPr>
+            <a:picLocks noChangeAspect="1" noChangeArrowheads="1"/>
+          </p:cNvPicPr>
+          <p:nvPr/>
+        </p:nvPicPr>
+        <p:blipFill>
+          <a:blip r:embed="rId2">
+            <a:extLst>
+              <a:ext uri="{28A0092B-C50C-407E-A947-70E740481C1C}">
+                <a14:useLocalDpi xmlns:a14="http://schemas.microsoft.com/office/drawing/2010/main" val="0"/>
+              </a:ext>
+            </a:extLst>
+          </a:blip>
+          <a:srcRect/>
+          <a:stretch>
+            <a:fillRect/>
+          </a:stretch>
+        </p:blipFill>
+        <p:spPr bwMode="auto">
+          <a:xfrm>
+            <a:off x="2438400" y="2774950"/>
+            <a:ext cx="4483100" cy="1473200"/>
+          </a:xfrm>
+          <a:prstGeom prst="rect">
+            <a:avLst/>
+          </a:prstGeom>
+          <a:noFill/>
+          <a:ln>
+            <a:noFill/>
+          </a:ln>
+          <a:effectLst/>
+          <a:extLst>
+            <a:ext uri="{909E8E84-426E-40DD-AFC4-6F175D3DCCD1}">
+              <a14:hiddenFill xmlns:a14="http://schemas.microsoft.com/office/drawing/2010/main">
+                <a:solidFill>
+                  <a:schemeClr val="accent1"/>
+                </a:solidFill>
+              </a14:hiddenFill>
+            </a:ext>
+            <a:ext uri="{91240B29-F687-4F45-9708-019B960494DF}">
+              <a14:hiddenLine xmlns:a14="http://schemas.microsoft.com/office/drawing/2010/main" w="9525">
+                <a:solidFill>
+                  <a:schemeClr val="tx1"/>
+                </a:solidFill>
+                <a:miter lim="800000"/>
+                <a:headEnd/>
+                <a:tailEnd/>
+              </a14:hiddenLine>
+            </a:ext>
+            <a:ext uri="{AF507438-7753-43E0-B8FC-AC1667EBCBE1}">
+              <a14:hiddenEffects xmlns:a14="http://schemas.microsoft.com/office/drawing/2010/main">
+                <a:effectLst>
+                  <a:outerShdw dist="35921" dir="2700000" algn="ctr" rotWithShape="0">
+                    <a:schemeClr val="bg2"/>
+                  </a:outerShdw>
+                </a:effectLst>
+              </a14:hiddenEffects>
+            </a:ext>
+          </a:extLst>
+        </p:spPr>
+      </p:pic>
+    </p:spTree>
+    <p:extLst>
+      <p:ext uri="{BB962C8B-B14F-4D97-AF65-F5344CB8AC3E}">
+        <p14:creationId xmlns:p14="http://schemas.microsoft.com/office/powerpoint/2010/main" val="900831533"/>
+      </p:ext>
+    </p:extLst>
+  </p:cSld>
+  <p:clrMapOvr>
+    <a:masterClrMapping/>
+  </p:clrMapOvr>
+  <p:timing>
+    <p:tnLst>
+      <p:par>
+        <p:cTn id="1" dur="indefinite" restart="never" nodeType="tmRoot"/>
+      </p:par>
+    </p:tnLst>
+  </p:timing>
+</p:sld>
+</file>
+
+<file path=ppt/slides/slide21.xml><?xml version="1.0" encoding="utf-8"?>
+<p:sld xmlns:a="http://schemas.openxmlformats.org/drawingml/2006/main" xmlns:r="http://schemas.openxmlformats.org/officeDocument/2006/relationships" xmlns:p="http://schemas.openxmlformats.org/presentationml/2006/main">
+  <p:cSld>
+    <p:spTree>
+      <p:nvGrpSpPr>
+        <p:cNvPr id="1" name=""/>
+        <p:cNvGrpSpPr/>
+        <p:nvPr/>
+      </p:nvGrpSpPr>
+      <p:grpSpPr>
+        <a:xfrm>
+          <a:off x="0" y="0"/>
+          <a:ext cx="0" cy="0"/>
+          <a:chOff x="0" y="0"/>
+          <a:chExt cx="0" cy="0"/>
+        </a:xfrm>
+      </p:grpSpPr>
+      <p:sp>
+        <p:nvSpPr>
+          <p:cNvPr id="2" name="Title 1"/>
+          <p:cNvSpPr>
+            <a:spLocks noGrp="1"/>
+          </p:cNvSpPr>
+          <p:nvPr>
+            <p:ph type="title"/>
+          </p:nvPr>
+        </p:nvSpPr>
+        <p:spPr/>
+        <p:txBody>
+          <a:bodyPr/>
+          <a:lstStyle/>
+          <a:p>
+            <a:r>
+              <a:rPr lang="en-IN" dirty="0" smtClean="0">
+                <a:solidFill>
+                  <a:schemeClr val="accent6">
+                    <a:lumMod val="75000"/>
+                  </a:schemeClr>
+                </a:solidFill>
+              </a:rPr>
+              <a:t>Few Assumptions </a:t>
+            </a:r>
+            <a:r>
+              <a:rPr lang="en-IN" dirty="0">
+                <a:solidFill>
+                  <a:schemeClr val="accent6">
+                    <a:lumMod val="75000"/>
+                  </a:schemeClr>
+                </a:solidFill>
+              </a:rPr>
+              <a:t>and Limitations</a:t>
+            </a:r>
+          </a:p>
+        </p:txBody>
+      </p:sp>
+      <p:sp>
+        <p:nvSpPr>
+          <p:cNvPr id="3" name="Content Placeholder 2"/>
+          <p:cNvSpPr>
+            <a:spLocks noGrp="1"/>
+          </p:cNvSpPr>
+          <p:nvPr>
+            <p:ph idx="1"/>
+          </p:nvPr>
+        </p:nvSpPr>
+        <p:spPr/>
+        <p:txBody>
+          <a:bodyPr>
+            <a:normAutofit/>
+          </a:bodyPr>
+          <a:lstStyle/>
+          <a:p>
+            <a:r>
+              <a:rPr lang="en-IN" sz="2000" dirty="0" smtClean="0"/>
+              <a:t>This </a:t>
+            </a:r>
+            <a:r>
+              <a:rPr lang="en-IN" sz="2000" dirty="0"/>
+              <a:t>is not continuous data. Thus the assumption is that the data is a snapshot </a:t>
+            </a:r>
+            <a:r>
+              <a:rPr lang="en-IN" sz="2000" dirty="0" smtClean="0"/>
+              <a:t>as some point </a:t>
+            </a:r>
+            <a:r>
+              <a:rPr lang="en-IN" sz="2000" dirty="0"/>
+              <a:t>in time e.g. the balance is for a given date.</a:t>
+            </a:r>
+          </a:p>
+          <a:p>
+            <a:r>
+              <a:rPr lang="en-IN" sz="2000" dirty="0" smtClean="0"/>
+              <a:t>There </a:t>
+            </a:r>
+            <a:r>
+              <a:rPr lang="en-IN" sz="2000" dirty="0"/>
+              <a:t>are customers who have exited but still have a balance in their account. </a:t>
+            </a:r>
+            <a:r>
+              <a:rPr lang="en-IN" sz="2000" dirty="0" smtClean="0"/>
+              <a:t>The assumption </a:t>
+            </a:r>
+            <a:r>
+              <a:rPr lang="en-IN" sz="2000" dirty="0"/>
+              <a:t>is that the customers had that much of amount when they cleared the account.</a:t>
+            </a:r>
+          </a:p>
+          <a:p>
+            <a:r>
+              <a:rPr lang="en-IN" sz="2000" dirty="0" smtClean="0"/>
+              <a:t>There </a:t>
+            </a:r>
+            <a:r>
+              <a:rPr lang="en-IN" sz="2000" dirty="0"/>
+              <a:t>is an active member but have exited. This should mean that the customer was </a:t>
+            </a:r>
+            <a:r>
+              <a:rPr lang="en-IN" sz="2000" dirty="0" smtClean="0"/>
+              <a:t>an active </a:t>
+            </a:r>
+            <a:r>
+              <a:rPr lang="en-IN" sz="2000" dirty="0"/>
+              <a:t>member before they left.</a:t>
+            </a:r>
+          </a:p>
+          <a:p>
+            <a:r>
+              <a:rPr lang="en-IN" sz="2000" dirty="0" smtClean="0"/>
+              <a:t>A </a:t>
+            </a:r>
+            <a:r>
+              <a:rPr lang="en-IN" sz="2000" dirty="0"/>
+              <a:t>break down to the products bought into by a customer could provide more </a:t>
+            </a:r>
+            <a:r>
+              <a:rPr lang="en-IN" sz="2000" dirty="0" smtClean="0"/>
+              <a:t>information topping </a:t>
+            </a:r>
+            <a:r>
+              <a:rPr lang="en-IN" sz="2000" dirty="0"/>
+              <a:t>listing of product count</a:t>
+            </a:r>
+          </a:p>
+        </p:txBody>
+      </p:sp>
+    </p:spTree>
+    <p:extLst>
+      <p:ext uri="{BB962C8B-B14F-4D97-AF65-F5344CB8AC3E}">
+        <p14:creationId xmlns:p14="http://schemas.microsoft.com/office/powerpoint/2010/main" val="2638751591"/>
+      </p:ext>
+    </p:extLst>
+  </p:cSld>
+  <p:clrMapOvr>
+    <a:masterClrMapping/>
+  </p:clrMapOvr>
+  <p:timing>
+    <p:tnLst>
+      <p:par>
+        <p:cTn id="1" dur="indefinite" restart="never" nodeType="tmRoot"/>
+      </p:par>
+    </p:tnLst>
+  </p:timing>
+</p:sld>
+</file>
+
+<file path=ppt/slides/slide22.xml><?xml version="1.0" encoding="utf-8"?>
+<p:sld xmlns:a="http://schemas.openxmlformats.org/drawingml/2006/main" xmlns:r="http://schemas.openxmlformats.org/officeDocument/2006/relationships" xmlns:p="http://schemas.openxmlformats.org/presentationml/2006/main">
+  <p:cSld>
+    <p:spTree>
+      <p:nvGrpSpPr>
+        <p:cNvPr id="1" name=""/>
+        <p:cNvGrpSpPr/>
+        <p:nvPr/>
+      </p:nvGrpSpPr>
+      <p:grpSpPr>
+        <a:xfrm>
+          <a:off x="0" y="0"/>
+          <a:ext cx="0" cy="0"/>
+          <a:chOff x="0" y="0"/>
+          <a:chExt cx="0" cy="0"/>
+        </a:xfrm>
+      </p:grpSpPr>
+      <p:sp>
+        <p:nvSpPr>
+          <p:cNvPr id="2" name="Title 1"/>
+          <p:cNvSpPr>
+            <a:spLocks noGrp="1"/>
+          </p:cNvSpPr>
+          <p:nvPr>
+            <p:ph type="title"/>
+          </p:nvPr>
+        </p:nvSpPr>
+        <p:spPr/>
+        <p:txBody>
+          <a:bodyPr/>
+          <a:lstStyle/>
+          <a:p>
+            <a:r>
+              <a:rPr lang="en-IN" dirty="0">
+                <a:solidFill>
+                  <a:schemeClr val="accent6">
+                    <a:lumMod val="75000"/>
+                  </a:schemeClr>
+                </a:solidFill>
+              </a:rPr>
+              <a:t>Conclusion</a:t>
+            </a:r>
+          </a:p>
+        </p:txBody>
+      </p:sp>
+      <p:sp>
+        <p:nvSpPr>
+          <p:cNvPr id="3" name="Content Placeholder 2"/>
+          <p:cNvSpPr>
+            <a:spLocks noGrp="1"/>
+          </p:cNvSpPr>
+          <p:nvPr>
+            <p:ph idx="1"/>
+          </p:nvPr>
+        </p:nvSpPr>
+        <p:spPr>
+          <a:xfrm>
+            <a:off x="457200" y="1352550"/>
+            <a:ext cx="8229600" cy="3394472"/>
+          </a:xfrm>
+        </p:spPr>
+        <p:txBody>
+          <a:bodyPr>
+            <a:normAutofit/>
+          </a:bodyPr>
+          <a:lstStyle/>
+          <a:p>
+            <a:r>
+              <a:rPr lang="en-IN" sz="2400" dirty="0" smtClean="0"/>
+              <a:t>Good </a:t>
+            </a:r>
+            <a:r>
+              <a:rPr lang="en-IN" sz="2400" dirty="0"/>
+              <a:t>P</a:t>
+            </a:r>
+            <a:r>
+              <a:rPr lang="en-IN" sz="2400" dirty="0" smtClean="0"/>
+              <a:t>recision and Recall</a:t>
+            </a:r>
+          </a:p>
+          <a:p>
+            <a:r>
+              <a:rPr lang="en-IN" sz="2400" dirty="0" err="1" smtClean="0"/>
+              <a:t>XGBoost</a:t>
+            </a:r>
+            <a:r>
+              <a:rPr lang="en-IN" sz="2400" dirty="0" smtClean="0"/>
+              <a:t> Classifier gave best results</a:t>
+            </a:r>
+          </a:p>
+          <a:p>
+            <a:r>
+              <a:rPr lang="en-IN" sz="2400" dirty="0" smtClean="0"/>
+              <a:t>Results improved using Over Sampling method.</a:t>
+            </a:r>
+          </a:p>
+          <a:p>
+            <a:r>
+              <a:rPr lang="en-IN" sz="2400" dirty="0" smtClean="0"/>
+              <a:t>Need continuous data for best accuracy.</a:t>
+            </a:r>
+            <a:endParaRPr lang="en-IN" sz="2400" dirty="0"/>
+          </a:p>
+        </p:txBody>
+      </p:sp>
+    </p:spTree>
+    <p:extLst>
+      <p:ext uri="{BB962C8B-B14F-4D97-AF65-F5344CB8AC3E}">
+        <p14:creationId xmlns:p14="http://schemas.microsoft.com/office/powerpoint/2010/main" val="842466602"/>
+      </p:ext>
+    </p:extLst>
+  </p:cSld>
+  <p:clrMapOvr>
+    <a:masterClrMapping/>
+  </p:clrMapOvr>
+  <p:timing>
+    <p:tnLst>
+      <p:par>
+        <p:cTn id="1" dur="indefinite" restart="never" nodeType="tmRoot"/>
+      </p:par>
+    </p:tnLst>
+  </p:timing>
+</p:sld>
+</file>
+
+<file path=ppt/slides/slide23.xml><?xml version="1.0" encoding="utf-8"?>
+<p:sld xmlns:a="http://schemas.openxmlformats.org/drawingml/2006/main" xmlns:r="http://schemas.openxmlformats.org/officeDocument/2006/relationships" xmlns:p="http://schemas.openxmlformats.org/presentationml/2006/main">
+  <p:cSld>
+    <p:spTree>
+      <p:nvGrpSpPr>
+        <p:cNvPr id="1" name=""/>
+        <p:cNvGrpSpPr/>
+        <p:nvPr/>
+      </p:nvGrpSpPr>
+      <p:grpSpPr>
+        <a:xfrm>
+          <a:off x="0" y="0"/>
+          <a:ext cx="0" cy="0"/>
+          <a:chOff x="0" y="0"/>
+          <a:chExt cx="0" cy="0"/>
+        </a:xfrm>
+      </p:grpSpPr>
+      <p:sp>
+        <p:nvSpPr>
+          <p:cNvPr id="2" name="Title 1"/>
+          <p:cNvSpPr>
+            <a:spLocks noGrp="1"/>
+          </p:cNvSpPr>
+          <p:nvPr>
+            <p:ph type="title"/>
+          </p:nvPr>
+        </p:nvSpPr>
+        <p:spPr>
+          <a:xfrm>
+            <a:off x="457200" y="2114550"/>
+            <a:ext cx="8229600" cy="857250"/>
+          </a:xfrm>
+        </p:spPr>
+        <p:txBody>
+          <a:bodyPr/>
+          <a:lstStyle/>
+          <a:p>
+            <a:r>
+              <a:rPr lang="en-IN" dirty="0" smtClean="0">
+                <a:solidFill>
+                  <a:schemeClr val="accent6">
+                    <a:lumMod val="75000"/>
+                  </a:schemeClr>
+                </a:solidFill>
+              </a:rPr>
+              <a:t>Thank You</a:t>
+            </a:r>
+            <a:endParaRPr lang="en-IN" dirty="0">
+              <a:solidFill>
+                <a:schemeClr val="accent6">
+                  <a:lumMod val="75000"/>
+                </a:schemeClr>
+              </a:solidFill>
+            </a:endParaRPr>
+          </a:p>
+        </p:txBody>
+      </p:sp>
+    </p:spTree>
+    <p:extLst>
+      <p:ext uri="{BB962C8B-B14F-4D97-AF65-F5344CB8AC3E}">
+        <p14:creationId xmlns:p14="http://schemas.microsoft.com/office/powerpoint/2010/main" val="3578148154"/>
+      </p:ext>
+    </p:extLst>
+  </p:cSld>
+  <p:clrMapOvr>
+    <a:masterClrMapping/>
+  </p:clrMapOvr>
+  <p:timing>
+    <p:tnLst>
+      <p:par>
+        <p:cTn id="1" dur="indefinite" restart="never" nodeType="tmRoot"/>
+      </p:par>
+    </p:tnLst>
+  </p:timing>
 </p:sld>
 </file>
 
@@ -3464,7 +6117,23 @@
           <a:bodyPr/>
           <a:lstStyle/>
           <a:p>
-            <a:endParaRPr lang="en-IN"/>
+            <a:r>
+              <a:rPr lang="en-IN" dirty="0" smtClean="0">
+                <a:solidFill>
+                  <a:schemeClr val="accent6">
+                    <a:lumMod val="75000"/>
+                  </a:schemeClr>
+                </a:solidFill>
+              </a:rPr>
+              <a:t>Why does churn happen?</a:t>
+            </a:r>
+            <a:endParaRPr lang="en-IN" dirty="0">
+              <a:solidFill>
+                <a:schemeClr val="accent6">
+                  <a:lumMod val="75000"/>
+                </a:schemeClr>
+              </a:solidFill>
+            </a:endParaRPr>
           </a:p>
         </p:txBody>
       </p:sp>
@@ -3478,12 +6147,70 @@
             <p:ph idx="1"/>
           </p:nvPr>
         </p:nvSpPr>
-        <p:spPr/>
-        <p:txBody>
-          <a:bodyPr/>
-          <a:lstStyle/>
-          <a:p>
-            <a:endParaRPr lang="en-IN"/>
+        <p:spPr>
+          <a:xfrm>
+            <a:off x="457200" y="895350"/>
+            <a:ext cx="8229600" cy="3394472"/>
+          </a:xfrm>
+        </p:spPr>
+        <p:txBody>
+          <a:bodyPr>
+            <a:noAutofit/>
+          </a:bodyPr>
+          <a:lstStyle/>
+          <a:p>
+            <a:pPr marL="0" indent="0">
+              <a:buNone/>
+            </a:pPr>
+            <a:endParaRPr lang="en-IN" sz="2800" dirty="0" smtClean="0"/>
+          </a:p>
+          <a:p>
+            <a:r>
+              <a:rPr lang="en-IN" sz="2800" dirty="0" smtClean="0"/>
+              <a:t>Availability </a:t>
+            </a:r>
+            <a:r>
+              <a:rPr lang="en-IN" sz="2800" dirty="0"/>
+              <a:t>of latest technology</a:t>
+            </a:r>
+          </a:p>
+          <a:p>
+            <a:r>
+              <a:rPr lang="en-IN" sz="2800" dirty="0" smtClean="0"/>
+              <a:t>Customer-friendly </a:t>
+            </a:r>
+            <a:r>
+              <a:rPr lang="en-IN" sz="2800" dirty="0"/>
+              <a:t>bank </a:t>
+            </a:r>
+            <a:r>
+              <a:rPr lang="en-IN" sz="2800" dirty="0" smtClean="0"/>
+              <a:t>staff</a:t>
+            </a:r>
+            <a:endParaRPr lang="en-IN" sz="2800" dirty="0"/>
+          </a:p>
+          <a:p>
+            <a:r>
+              <a:rPr lang="en-IN" sz="2800" dirty="0" smtClean="0"/>
+              <a:t>Low </a:t>
+            </a:r>
+            <a:r>
+              <a:rPr lang="en-IN" sz="2800" dirty="0"/>
+              <a:t>interest rates</a:t>
+            </a:r>
+          </a:p>
+          <a:p>
+            <a:r>
+              <a:rPr lang="en-IN" sz="2800" dirty="0" smtClean="0"/>
+              <a:t>Location</a:t>
+            </a:r>
+            <a:endParaRPr lang="en-IN" sz="2800" dirty="0"/>
+          </a:p>
+          <a:p>
+            <a:r>
+              <a:rPr lang="en-IN" sz="2800" dirty="0" smtClean="0"/>
+              <a:t>Services offered</a:t>
+            </a:r>
           </a:p>
         </p:txBody>
       </p:sp>
@@ -3497,6 +6224,13 @@
   <p:clrMapOvr>
     <a:masterClrMapping/>
   </p:clrMapOvr>
+  <p:timing>
+    <p:tnLst>
+      <p:par>
+        <p:cTn id="1" dur="indefinite" restart="never" nodeType="tmRoot"/>
+      </p:par>
+    </p:tnLst>
+  </p:timing>
 </p:sld>
 </file>
 
@@ -3532,7 +6266,23 @@
           <a:bodyPr/>
           <a:lstStyle/>
           <a:p>
-            <a:endParaRPr lang="en-IN"/>
+            <a:r>
+              <a:rPr lang="en-IN" dirty="0" smtClean="0">
+                <a:solidFill>
+                  <a:schemeClr val="accent6">
+                    <a:lumMod val="75000"/>
+                  </a:schemeClr>
+                </a:solidFill>
+              </a:rPr>
+              <a:t>Importance of this Analysis</a:t>
+            </a:r>
+            <a:endParaRPr lang="en-IN" dirty="0">
+              <a:solidFill>
+                <a:schemeClr val="accent6">
+                  <a:lumMod val="75000"/>
+                </a:schemeClr>
+              </a:solidFill>
+            </a:endParaRPr>
           </a:p>
         </p:txBody>
       </p:sp>
@@ -3548,10 +6298,44 @@
         </p:nvSpPr>
         <p:spPr/>
         <p:txBody>
-          <a:bodyPr/>
-          <a:lstStyle/>
-          <a:p>
-            <a:endParaRPr lang="en-IN"/>
+          <a:bodyPr>
+            <a:noAutofit/>
+          </a:bodyPr>
+          <a:lstStyle/>
+          <a:p>
+            <a:r>
+              <a:rPr lang="en-IN" sz="2400" dirty="0" smtClean="0"/>
+              <a:t>The </a:t>
+            </a:r>
+            <a:r>
+              <a:rPr lang="en-IN" sz="2400" dirty="0"/>
+              <a:t>cost of attracting new customers can be five to six times more than holding on to an existing customers</a:t>
+            </a:r>
+          </a:p>
+          <a:p>
+            <a:r>
+              <a:rPr lang="en-IN" sz="2400" dirty="0" smtClean="0"/>
+              <a:t>Long </a:t>
+            </a:r>
+            <a:r>
+              <a:rPr lang="en-IN" sz="2400" dirty="0"/>
+              <a:t>term customers become less costly to serve, they generate higher profits, and they may also provide new referrals</a:t>
+            </a:r>
+          </a:p>
+          <a:p>
+            <a:r>
+              <a:rPr lang="en-IN" sz="2400" dirty="0" smtClean="0"/>
+              <a:t>Losing </a:t>
+            </a:r>
+            <a:r>
+              <a:rPr lang="en-IN" sz="2400" dirty="0"/>
+              <a:t>a customer usually leads to loss in profit for the bank</a:t>
+            </a:r>
+            <a:r>
+              <a:rPr lang="en-IN" sz="2400" dirty="0" smtClean="0"/>
+              <a:t>.</a:t>
+            </a:r>
+            <a:endParaRPr lang="en-IN" sz="2400" dirty="0"/>
           </a:p>
         </p:txBody>
       </p:sp>
@@ -3565,6 +6349,13 @@
   <p:clrMapOvr>
     <a:masterClrMapping/>
   </p:clrMapOvr>
+  <p:timing>
+    <p:tnLst>
+      <p:par>
+        <p:cTn id="1" dur="indefinite" restart="never" nodeType="tmRoot"/>
+      </p:par>
+    </p:tnLst>
+  </p:timing>
 </p:sld>
 </file>
 
@@ -3600,7 +6391,33 @@
           <a:bodyPr/>
           <a:lstStyle/>
           <a:p>
-            <a:endParaRPr lang="en-IN"/>
+            <a:r>
+              <a:rPr lang="en-IN" dirty="0" smtClean="0">
+                <a:solidFill>
+                  <a:schemeClr val="accent6">
+                    <a:lumMod val="75000"/>
+                  </a:schemeClr>
+                </a:solidFill>
+              </a:rPr>
+              <a:t>Data: Churn </a:t>
+            </a:r>
+            <a:r>
+              <a:rPr lang="en-IN" dirty="0">
+                <a:solidFill>
+                  <a:schemeClr val="accent6">
+                    <a:lumMod val="75000"/>
+                  </a:schemeClr>
+                </a:solidFill>
+              </a:rPr>
+              <a:t>prediction variables</a:t>
+            </a:r>
+            <a:endParaRPr lang="en-IN" dirty="0">
+              <a:solidFill>
+                <a:schemeClr val="accent6">
+                  <a:lumMod val="75000"/>
+                </a:schemeClr>
+              </a:solidFill>
+            </a:endParaRPr>
           </a:p>
         </p:txBody>
       </p:sp>
@@ -3616,10 +6433,69 @@
         </p:nvSpPr>
         <p:spPr/>
         <p:txBody>
-          <a:bodyPr/>
-          <a:lstStyle/>
-          <a:p>
-            <a:endParaRPr lang="en-IN"/>
+          <a:bodyPr>
+            <a:normAutofit fontScale="70000" lnSpcReduction="20000"/>
+          </a:bodyPr>
+          <a:lstStyle/>
+          <a:p>
+            <a:r>
+              <a:rPr lang="en-IN" dirty="0" smtClean="0"/>
+              <a:t>Credit Score</a:t>
+            </a:r>
+          </a:p>
+          <a:p>
+            <a:r>
+              <a:rPr lang="en-IN" dirty="0" smtClean="0"/>
+              <a:t>Age</a:t>
+            </a:r>
+          </a:p>
+          <a:p>
+            <a:r>
+              <a:rPr lang="en-IN" dirty="0" smtClean="0"/>
+              <a:t>Gender</a:t>
+            </a:r>
+          </a:p>
+          <a:p>
+            <a:r>
+              <a:rPr lang="en-IN" dirty="0" smtClean="0"/>
+              <a:t>Geography</a:t>
+            </a:r>
+          </a:p>
+          <a:p>
+            <a:r>
+              <a:rPr lang="en-IN" dirty="0" smtClean="0"/>
+              <a:t>Number of products</a:t>
+            </a:r>
+          </a:p>
+          <a:p>
+            <a:r>
+              <a:rPr lang="en-IN" dirty="0" smtClean="0"/>
+              <a:t>Estimated Salary</a:t>
+            </a:r>
+          </a:p>
+          <a:p>
+            <a:r>
+              <a:rPr lang="en-IN" dirty="0" smtClean="0"/>
+              <a:t>Balance</a:t>
+            </a:r>
+          </a:p>
+          <a:p>
+            <a:r>
+              <a:rPr lang="en-IN" dirty="0" smtClean="0"/>
+              <a:t>Tenure</a:t>
+            </a:r>
+          </a:p>
+          <a:p>
+            <a:r>
+              <a:rPr lang="en-IN" dirty="0" smtClean="0"/>
+              <a:t>Has Credit Card or not</a:t>
+            </a:r>
+          </a:p>
+          <a:p>
+            <a:r>
+              <a:rPr lang="en-IN" dirty="0" smtClean="0"/>
+              <a:t>Is active member or not</a:t>
+            </a:r>
           </a:p>
         </p:txBody>
       </p:sp>
@@ -3633,6 +6509,13 @@
   <p:clrMapOvr>
     <a:masterClrMapping/>
   </p:clrMapOvr>
+  <p:timing>
+    <p:tnLst>
+      <p:par>
+        <p:cTn id="1" dur="indefinite" restart="never" nodeType="tmRoot"/>
+      </p:par>
+    </p:tnLst>
+  </p:timing>
 </p:sld>
 </file>
 
@@ -3663,31 +6546,33 @@
             <p:ph type="title"/>
           </p:nvPr>
         </p:nvSpPr>
-        <p:spPr/>
+        <p:spPr>
+          <a:xfrm>
+            <a:off x="457200" y="2038350"/>
+            <a:ext cx="8229600" cy="857250"/>
+          </a:xfrm>
+        </p:spPr>
         <p:txBody>
           <a:bodyPr/>
           <a:lstStyle/>
           <a:p>
-            <a:endParaRPr lang="en-IN"/>
-          </a:p>
-        </p:txBody>
-      </p:sp>
-      <p:sp>
-        <p:nvSpPr>
-          <p:cNvPr id="3" name="Content Placeholder 2"/>
-          <p:cNvSpPr>
-            <a:spLocks noGrp="1"/>
-          </p:cNvSpPr>
-          <p:nvPr>
-            <p:ph idx="1"/>
-          </p:nvPr>
-        </p:nvSpPr>
-        <p:spPr/>
-        <p:txBody>
-          <a:bodyPr/>
-          <a:lstStyle/>
-          <a:p>
-            <a:endParaRPr lang="en-IN"/>
+            <a:r>
+              <a:rPr lang="en-IN" dirty="0" smtClean="0">
+                <a:solidFill>
+                  <a:schemeClr val="accent6">
+                    <a:lumMod val="75000"/>
+                  </a:schemeClr>
+                </a:solidFill>
+              </a:rPr>
+              <a:t>Exploratory Analysis</a:t>
+            </a:r>
+            <a:endParaRPr lang="en-IN" dirty="0">
+              <a:solidFill>
+                <a:schemeClr val="accent6">
+                  <a:lumMod val="75000"/>
+                </a:schemeClr>
+              </a:solidFill>
+            </a:endParaRPr>
           </a:p>
         </p:txBody>
       </p:sp>
@@ -3701,6 +6586,13 @@
   <p:clrMapOvr>
     <a:masterClrMapping/>
   </p:clrMapOvr>
+  <p:timing>
+    <p:tnLst>
+      <p:par>
+        <p:cTn id="1" dur="indefinite" restart="never" nodeType="tmRoot"/>
+      </p:par>
+    </p:tnLst>
+  </p:timing>
 </p:sld>
 </file>
 
@@ -3736,39 +6628,109 @@
           <a:bodyPr/>
           <a:lstStyle/>
           <a:p>
-            <a:endParaRPr lang="en-IN"/>
-          </a:p>
-        </p:txBody>
-      </p:sp>
-      <p:sp>
-        <p:nvSpPr>
-          <p:cNvPr id="3" name="Content Placeholder 2"/>
-          <p:cNvSpPr>
-            <a:spLocks noGrp="1"/>
-          </p:cNvSpPr>
+            <a:r>
+              <a:rPr lang="en-IN" dirty="0" smtClean="0">
+                <a:solidFill>
+                  <a:schemeClr val="accent6">
+                    <a:lumMod val="75000"/>
+                  </a:schemeClr>
+                </a:solidFill>
+              </a:rPr>
+              <a:t>Age</a:t>
+            </a:r>
+            <a:endParaRPr lang="en-IN" dirty="0">
+              <a:solidFill>
+                <a:schemeClr val="accent6">
+                  <a:lumMod val="75000"/>
+                </a:schemeClr>
+              </a:solidFill>
+            </a:endParaRPr>
+          </a:p>
+        </p:txBody>
+      </p:sp>
+      <p:pic>
+        <p:nvPicPr>
+          <p:cNvPr id="4" name="Picture 2"/>
+          <p:cNvPicPr>
+            <a:picLocks noGrp="1" noChangeAspect="1" noChangeArrowheads="1"/>
+          </p:cNvPicPr>
           <p:nvPr>
             <p:ph idx="1"/>
           </p:nvPr>
-        </p:nvSpPr>
-        <p:spPr/>
-        <p:txBody>
-          <a:bodyPr/>
-          <a:lstStyle/>
-          <a:p>
-            <a:endParaRPr lang="en-IN"/>
-          </a:p>
-        </p:txBody>
-      </p:sp>
+        </p:nvPicPr>
+        <p:blipFill>
+          <a:blip r:embed="rId2">
+            <a:extLst>
+              <a:ext uri="{28A0092B-C50C-407E-A947-70E740481C1C}">
+                <a14:useLocalDpi xmlns:a14="http://schemas.microsoft.com/office/drawing/2010/main" val="0"/>
+              </a:ext>
+            </a:extLst>
+          </a:blip>
+          <a:srcRect/>
+          <a:stretch>
+            <a:fillRect/>
+          </a:stretch>
+        </p:blipFill>
+        <p:spPr bwMode="auto">
+          <a:xfrm>
+            <a:off x="762000" y="1200150"/>
+            <a:ext cx="7678733" cy="3240159"/>
+          </a:xfrm>
+          <a:prstGeom prst="rect">
+            <a:avLst/>
+          </a:prstGeom>
+          <a:noFill/>
+          <a:ln>
+            <a:noFill/>
+          </a:ln>
+          <a:effectLst/>
+          <a:extLst>
+            <a:ext uri="{909E8E84-426E-40DD-AFC4-6F175D3DCCD1}">
+              <a14:hiddenFill xmlns:a14="http://schemas.microsoft.com/office/drawing/2010/main">
+                <a:solidFill>
+                  <a:schemeClr val="accent1"/>
+                </a:solidFill>
+              </a14:hiddenFill>
+            </a:ext>
+            <a:ext uri="{91240B29-F687-4F45-9708-019B960494DF}">
+              <a14:hiddenLine xmlns:a14="http://schemas.microsoft.com/office/drawing/2010/main" w="9525">
+                <a:solidFill>
+                  <a:schemeClr val="tx1"/>
+                </a:solidFill>
+                <a:miter lim="800000"/>
+                <a:headEnd/>
+                <a:tailEnd/>
+              </a14:hiddenLine>
+            </a:ext>
+            <a:ext uri="{AF507438-7753-43E0-B8FC-AC1667EBCBE1}">
+              <a14:hiddenEffects xmlns:a14="http://schemas.microsoft.com/office/drawing/2010/main">
+                <a:effectLst>
+                  <a:outerShdw dist="35921" dir="2700000" algn="ctr" rotWithShape="0">
+                    <a:schemeClr val="bg2"/>
+                  </a:outerShdw>
+                </a:effectLst>
+              </a14:hiddenEffects>
+            </a:ext>
+          </a:extLst>
+        </p:spPr>
+      </p:pic>
     </p:spTree>
     <p:extLst>
       <p:ext uri="{BB962C8B-B14F-4D97-AF65-F5344CB8AC3E}">
-        <p14:creationId xmlns:p14="http://schemas.microsoft.com/office/powerpoint/2010/main" val="216655072"/>
+        <p14:creationId xmlns:p14="http://schemas.microsoft.com/office/powerpoint/2010/main" val="1916778200"/>
       </p:ext>
     </p:extLst>
   </p:cSld>
   <p:clrMapOvr>
     <a:masterClrMapping/>
   </p:clrMapOvr>
+  <p:timing>
+    <p:tnLst>
+      <p:par>
+        <p:cTn id="1" dur="indefinite" restart="never" nodeType="tmRoot"/>
+      </p:par>
+    </p:tnLst>
+  </p:timing>
 </p:sld>
 </file>
 
@@ -3804,39 +6766,109 @@
           <a:bodyPr/>
           <a:lstStyle/>
           <a:p>
-            <a:endParaRPr lang="en-IN"/>
-          </a:p>
-        </p:txBody>
-      </p:sp>
-      <p:sp>
-        <p:nvSpPr>
-          <p:cNvPr id="3" name="Content Placeholder 2"/>
-          <p:cNvSpPr>
-            <a:spLocks noGrp="1"/>
-          </p:cNvSpPr>
+            <a:r>
+              <a:rPr lang="en-IN" dirty="0" smtClean="0">
+                <a:solidFill>
+                  <a:schemeClr val="accent6">
+                    <a:lumMod val="75000"/>
+                  </a:schemeClr>
+                </a:solidFill>
+              </a:rPr>
+              <a:t>Gender</a:t>
+            </a:r>
+            <a:endParaRPr lang="en-IN" dirty="0">
+              <a:solidFill>
+                <a:schemeClr val="accent6">
+                  <a:lumMod val="75000"/>
+                </a:schemeClr>
+              </a:solidFill>
+            </a:endParaRPr>
+          </a:p>
+        </p:txBody>
+      </p:sp>
+      <p:pic>
+        <p:nvPicPr>
+          <p:cNvPr id="2051" name="Picture 3"/>
+          <p:cNvPicPr>
+            <a:picLocks noGrp="1" noChangeAspect="1" noChangeArrowheads="1"/>
+          </p:cNvPicPr>
           <p:nvPr>
             <p:ph idx="1"/>
           </p:nvPr>
-        </p:nvSpPr>
-        <p:spPr/>
-        <p:txBody>
-          <a:bodyPr/>
-          <a:lstStyle/>
-          <a:p>
-            <a:endParaRPr lang="en-IN"/>
-          </a:p>
-        </p:txBody>
-      </p:sp>
+        </p:nvPicPr>
+        <p:blipFill>
+          <a:blip r:embed="rId2">
+            <a:extLst>
+              <a:ext uri="{28A0092B-C50C-407E-A947-70E740481C1C}">
+                <a14:useLocalDpi xmlns:a14="http://schemas.microsoft.com/office/drawing/2010/main" val="0"/>
+              </a:ext>
+            </a:extLst>
+          </a:blip>
+          <a:srcRect/>
+          <a:stretch>
+            <a:fillRect/>
+          </a:stretch>
+        </p:blipFill>
+        <p:spPr bwMode="auto">
+          <a:xfrm>
+            <a:off x="533400" y="1323512"/>
+            <a:ext cx="8229600" cy="3147351"/>
+          </a:xfrm>
+          <a:prstGeom prst="rect">
+            <a:avLst/>
+          </a:prstGeom>
+          <a:noFill/>
+          <a:ln>
+            <a:noFill/>
+          </a:ln>
+          <a:effectLst/>
+          <a:extLst>
+            <a:ext uri="{909E8E84-426E-40DD-AFC4-6F175D3DCCD1}">
+              <a14:hiddenFill xmlns:a14="http://schemas.microsoft.com/office/drawing/2010/main">
+                <a:solidFill>
+                  <a:schemeClr val="accent1"/>
+                </a:solidFill>
+              </a14:hiddenFill>
+            </a:ext>
+            <a:ext uri="{91240B29-F687-4F45-9708-019B960494DF}">
+              <a14:hiddenLine xmlns:a14="http://schemas.microsoft.com/office/drawing/2010/main" w="9525">
+                <a:solidFill>
+                  <a:schemeClr val="tx1"/>
+                </a:solidFill>
+                <a:miter lim="800000"/>
+                <a:headEnd/>
+                <a:tailEnd/>
+              </a14:hiddenLine>
+            </a:ext>
+            <a:ext uri="{AF507438-7753-43E0-B8FC-AC1667EBCBE1}">
+              <a14:hiddenEffects xmlns:a14="http://schemas.microsoft.com/office/drawing/2010/main">
+                <a:effectLst>
+                  <a:outerShdw dist="35921" dir="2700000" algn="ctr" rotWithShape="0">
+                    <a:schemeClr val="bg2"/>
+                  </a:outerShdw>
+                </a:effectLst>
+              </a14:hiddenEffects>
+            </a:ext>
+          </a:extLst>
+        </p:spPr>
+      </p:pic>
     </p:spTree>
     <p:extLst>
       <p:ext uri="{BB962C8B-B14F-4D97-AF65-F5344CB8AC3E}">
-        <p14:creationId xmlns:p14="http://schemas.microsoft.com/office/powerpoint/2010/main" val="592828714"/>
+        <p14:creationId xmlns:p14="http://schemas.microsoft.com/office/powerpoint/2010/main" val="216655072"/>
       </p:ext>
     </p:extLst>
   </p:cSld>
   <p:clrMapOvr>
     <a:masterClrMapping/>
   </p:clrMapOvr>
+  <p:timing>
+    <p:tnLst>
+      <p:par>
+        <p:cTn id="1" dur="indefinite" restart="never" nodeType="tmRoot"/>
+      </p:par>
+    </p:tnLst>
+  </p:timing>
 </p:sld>
 </file>
 
@@ -3869,32 +6901,97 @@
         </p:nvSpPr>
         <p:spPr/>
         <p:txBody>
-          <a:bodyPr/>
-          <a:lstStyle/>
-          <a:p>
-            <a:endParaRPr lang="en-IN"/>
-          </a:p>
-        </p:txBody>
-      </p:sp>
-      <p:sp>
-        <p:nvSpPr>
-          <p:cNvPr id="3" name="Content Placeholder 2"/>
-          <p:cNvSpPr>
-            <a:spLocks noGrp="1"/>
-          </p:cNvSpPr>
+          <a:bodyPr>
+            <a:normAutofit fontScale="90000"/>
+          </a:bodyPr>
+          <a:lstStyle/>
+          <a:p>
+            <a:r>
+              <a:rPr lang="en-IN" dirty="0" smtClean="0">
+                <a:solidFill>
+                  <a:schemeClr val="accent6">
+                    <a:lumMod val="75000"/>
+                  </a:schemeClr>
+                </a:solidFill>
+              </a:rPr>
+              <a:t>Active Member and Geography count</a:t>
+            </a:r>
+            <a:endParaRPr lang="en-IN" dirty="0">
+              <a:solidFill>
+                <a:schemeClr val="accent6">
+                  <a:lumMod val="75000"/>
+                </a:schemeClr>
+              </a:solidFill>
+            </a:endParaRPr>
+          </a:p>
+        </p:txBody>
+      </p:sp>
+      <p:pic>
+        <p:nvPicPr>
+          <p:cNvPr id="4099" name="Picture 3"/>
+          <p:cNvPicPr>
+            <a:picLocks noGrp="1" noChangeAspect="1" noChangeArrowheads="1"/>
+          </p:cNvPicPr>
           <p:nvPr>
             <p:ph idx="1"/>
           </p:nvPr>
-        </p:nvSpPr>
-        <p:spPr/>
-        <p:txBody>
-          <a:bodyPr/>
-          <a:lstStyle/>
-          <a:p>
-            <a:endParaRPr lang="en-IN"/>
-          </a:p>
-        </p:txBody>
-      </p:sp>
+        </p:nvPicPr>
+        <p:blipFill>
+          <a:blip r:embed="rId2">
+            <a:extLst>
+              <a:ext uri="{28A0092B-C50C-407E-A947-70E740481C1C}">
+                <a14:useLocalDpi xmlns:a14="http://schemas.microsoft.com/office/drawing/2010/main" val="0"/>
+              </a:ext>
+            </a:extLst>
+          </a:blip>
+          <a:srcRect/>
+          <a:stretch>
+            <a:fillRect/>
+          </a:stretch>
+        </p:blipFill>
+        <p:spPr bwMode="auto">
+          <a:xfrm>
+            <a:off x="485565" y="1487415"/>
+            <a:ext cx="8172870" cy="2819545"/>
+          </a:xfrm>
+          <a:prstGeom prst="rect">
+            <a:avLst/>
+          </a:prstGeom>
+          <a:noFill/>
+          <a:ln>
+            <a:noFill/>
+          </a:ln>
+          <a:effectLst/>
+          <a:extLst>
+            <a:ext uri="{909E8E84-426E-40DD-AFC4-6F175D3DCCD1}">
+              <a14:hiddenFill xmlns:a14="http://schemas.microsoft.com/office/drawing/2010/main">
+                <a:solidFill>
+                  <a:schemeClr val="accent1"/>
+                </a:solidFill>
+              </a14:hiddenFill>
+            </a:ext>
+            <a:ext uri="{91240B29-F687-4F45-9708-019B960494DF}">
+              <a14:hiddenLine xmlns:a14="http://schemas.microsoft.com/office/drawing/2010/main" w="9525">
+                <a:solidFill>
+                  <a:schemeClr val="tx1"/>
+                </a:solidFill>
+                <a:miter lim="800000"/>
+                <a:headEnd/>
+                <a:tailEnd/>
+              </a14:hiddenLine>
+            </a:ext>
+            <a:ext uri="{AF507438-7753-43E0-B8FC-AC1667EBCBE1}">
+              <a14:hiddenEffects xmlns:a14="http://schemas.microsoft.com/office/drawing/2010/main">
+                <a:effectLst>
+                  <a:outerShdw dist="35921" dir="2700000" algn="ctr" rotWithShape="0">
+                    <a:schemeClr val="bg2"/>
+                  </a:outerShdw>
+                </a:effectLst>
+              </a14:hiddenEffects>
+            </a:ext>
+          </a:extLst>
+        </p:spPr>
+      </p:pic>
     </p:spTree>
     <p:extLst>
       <p:ext uri="{BB962C8B-B14F-4D97-AF65-F5344CB8AC3E}">
@@ -3905,48 +7002,55 @@
   <p:clrMapOvr>
     <a:masterClrMapping/>
   </p:clrMapOvr>
+  <p:timing>
+    <p:tnLst>
+      <p:par>
+        <p:cTn id="1" dur="indefinite" restart="never" nodeType="tmRoot"/>
+      </p:par>
+    </p:tnLst>
+  </p:timing>
 </p:sld>
 </file>
 
 <file path=ppt/theme/theme1.xml><?xml version="1.0" encoding="utf-8"?>
 <a:theme xmlns:a="http://schemas.openxmlformats.org/drawingml/2006/main" name="Office Theme">
   <a:themeElements>
-    <a:clrScheme name="Office">
+    <a:clrScheme name="Essential">
       <a:dk1>
-        <a:sysClr val="windowText" lastClr="000000"/>
+        <a:srgbClr val="000000"/>
       </a:dk1>
       <a:lt1>
-        <a:sysClr val="window" lastClr="FFFFFF"/>
+        <a:srgbClr val="FFFFFF"/>
       </a:lt1>
       <a:dk2>
-        <a:srgbClr val="1F497D"/>
+        <a:srgbClr val="D1282E"/>
       </a:dk2>
       <a:lt2>
-        <a:srgbClr val="EEECE1"/>
+        <a:srgbClr val="C8C8B1"/>
       </a:lt2>
       <a:accent1>
-        <a:srgbClr val="4F81BD"/>
+        <a:srgbClr val="7A7A7A"/>
       </a:accent1>
       <a:accent2>
-        <a:srgbClr val="C0504D"/>
+        <a:srgbClr val="F5C201"/>
       </a:accent2>
       <a:accent3>
-        <a:srgbClr val="9BBB59"/>
+        <a:srgbClr val="526DB0"/>
       </a:accent3>
       <a:accent4>
-        <a:srgbClr val="8064A2"/>
+        <a:srgbClr val="989AAC"/>
       </a:accent4>
       <a:accent5>
-        <a:srgbClr val="4BACC6"/>
+        <a:srgbClr val="DC5924"/>
       </a:accent5>
       <a:accent6>
-        <a:srgbClr val="F79646"/>
+        <a:srgbClr val="B4B392"/>
       </a:accent6>
       <a:hlink>
-        <a:srgbClr val="0000FF"/>
+        <a:srgbClr val="CC9900"/>
       </a:hlink>
       <a:folHlink>
-        <a:srgbClr val="800080"/>
+        <a:srgbClr val="969696"/>
       </a:folHlink>
     </a:clrScheme>
     <a:fontScheme name="Office">
@@ -3983,6 +7087,7 @@
         <a:font script="Mong" typeface="Mongolian Baiti"/>
         <a:font script="Viet" typeface="Times New Roman"/>
         <a:font script="Uigh" typeface="Microsoft Uighur"/>
+        <a:font script="Geor" typeface="Sylfaen"/>
       </a:majorFont>
       <a:minorFont>
         <a:latin typeface="Calibri"/>
@@ -4017,6 +7122,7 @@
         <a:font script="Mong" typeface="Mongolian Baiti"/>
         <a:font script="Viet" typeface="Arial"/>
         <a:font script="Uigh" typeface="Microsoft Uighur"/>
+        <a:font script="Geor" typeface="Sylfaen"/>
       </a:minorFont>
     </a:fontScheme>
     <a:fmtScheme name="Office">
@@ -4189,4 +7295,332 @@
   <a:objectDefaults/>
   <a:extraClrSchemeLst/>
 </a:theme>
+</file>
+
+<file path=ppt/theme/theme2.xml><?xml version="1.0" encoding="utf-8"?>
+<a:theme xmlns:a="http://schemas.openxmlformats.org/drawingml/2006/main" name="Office Theme">
+  <a:themeElements>
+    <a:clrScheme name="Office">
+      <a:dk1>
+        <a:sysClr val="windowText" lastClr="000000"/>
+      </a:dk1>
+      <a:lt1>
+        <a:sysClr val="window" lastClr="FFFFFF"/>
+      </a:lt1>
+      <a:dk2>
+        <a:srgbClr val="1F497D"/>
+      </a:dk2>
+      <a:lt2>
+        <a:srgbClr val="EEECE1"/>
+      </a:lt2>
+      <a:accent1>
+        <a:srgbClr val="4F81BD"/>
+      </a:accent1>
+      <a:accent2>
+        <a:srgbClr val="C0504D"/>
+      </a:accent2>
+      <a:accent3>
+        <a:srgbClr val="9BBB59"/>
+      </a:accent3>
+      <a:accent4>
+        <a:srgbClr val="8064A2"/>
+      </a:accent4>
+      <a:accent5>
+        <a:srgbClr val="4BACC6"/>
+      </a:accent5>
+      <a:accent6>
+        <a:srgbClr val="F79646"/>
+      </a:accent6>
+      <a:hlink>
+        <a:srgbClr val="0000FF"/>
+      </a:hlink>
+      <a:folHlink>
+        <a:srgbClr val="800080"/>
+      </a:folHlink>
+    </a:clrScheme>
+    <a:fontScheme name="Office">
+      <a:majorFont>
+        <a:latin typeface="Calibri"/>
+        <a:ea typeface=""/>
+        <a:cs typeface=""/>
+        <a:font script="Jpan" typeface="ＭＳ Ｐゴシック"/>
+        <a:font script="Hang" typeface="맑은 고딕"/>
+        <a:font script="Hans" typeface="宋体"/>
+        <a:font script="Hant" typeface="新細明體"/>
+        <a:font script="Arab" typeface="Times New Roman"/>
+        <a:font script="Hebr" typeface="Times New Roman"/>
+        <a:font script="Thai" typeface="Angsana New"/>
+        <a:font script="Ethi" typeface="Nyala"/>
+        <a:font script="Beng" typeface="Vrinda"/>
+        <a:font script="Gujr" typeface="Shruti"/>
+        <a:font script="Khmr" typeface="MoolBoran"/>
+        <a:font script="Knda" typeface="Tunga"/>
+        <a:font script="Guru" typeface="Raavi"/>
+        <a:font script="Cans" typeface="Euphemia"/>
+        <a:font script="Cher" typeface="Plantagenet Cherokee"/>
+        <a:font script="Yiii" typeface="Microsoft Yi Baiti"/>
+        <a:font script="Tibt" typeface="Microsoft Himalaya"/>
+        <a:font script="Thaa" typeface="MV Boli"/>
+        <a:font script="Deva" typeface="Mangal"/>
+        <a:font script="Telu" typeface="Gautami"/>
+        <a:font script="Taml" typeface="Latha"/>
+        <a:font script="Syrc" typeface="Estrangelo Edessa"/>
+        <a:font script="Orya" typeface="Kalinga"/>
+        <a:font script="Mlym" typeface="Kartika"/>
+        <a:font script="Laoo" typeface="DokChampa"/>
+        <a:font script="Sinh" typeface="Iskoola Pota"/>
+        <a:font script="Mong" typeface="Mongolian Baiti"/>
+        <a:font script="Viet" typeface="Times New Roman"/>
+        <a:font script="Uigh" typeface="Microsoft Uighur"/>
+        <a:font script="Geor" typeface="Sylfaen"/>
+      </a:majorFont>
+      <a:minorFont>
+        <a:latin typeface="Calibri"/>
+        <a:ea typeface=""/>
+        <a:cs typeface=""/>
+        <a:font script="Jpan" typeface="ＭＳ Ｐゴシック"/>
+        <a:font script="Hang" typeface="맑은 고딕"/>
+        <a:font script="Hans" typeface="宋体"/>
+        <a:font script="Hant" typeface="新細明體"/>
+        <a:font script="Arab" typeface="Arial"/>
+        <a:font script="Hebr" typeface="Arial"/>
+        <a:font script="Thai" typeface="Cordia New"/>
+        <a:font script="Ethi" typeface="Nyala"/>
+        <a:font script="Beng" typeface="Vrinda"/>
+        <a:font script="Gujr" typeface="Shruti"/>
+        <a:font script="Khmr" typeface="DaunPenh"/>
+        <a:font script="Knda" typeface="Tunga"/>
+        <a:font script="Guru" typeface="Raavi"/>
+        <a:font script="Cans" typeface="Euphemia"/>
+        <a:font script="Cher" typeface="Plantagenet Cherokee"/>
+        <a:font script="Yiii" typeface="Microsoft Yi Baiti"/>
+        <a:font script="Tibt" typeface="Microsoft Himalaya"/>
+        <a:font script="Thaa" typeface="MV Boli"/>
+        <a:font script="Deva" typeface="Mangal"/>
+        <a:font script="Telu" typeface="Gautami"/>
+        <a:font script="Taml" typeface="Latha"/>
+        <a:font script="Syrc" typeface="Estrangelo Edessa"/>
+        <a:font script="Orya" typeface="Kalinga"/>
+        <a:font script="Mlym" typeface="Kartika"/>
+        <a:font script="Laoo" typeface="DokChampa"/>
+        <a:font script="Sinh" typeface="Iskoola Pota"/>
+        <a:font script="Mong" typeface="Mongolian Baiti"/>
+        <a:font script="Viet" typeface="Arial"/>
+        <a:font script="Uigh" typeface="Microsoft Uighur"/>
+        <a:font script="Geor" typeface="Sylfaen"/>
+      </a:minorFont>
+    </a:fontScheme>
+    <a:fmtScheme name="Office">
+      <a:fillStyleLst>
+        <a:solidFill>
+          <a:schemeClr val="phClr"/>
+        </a:solidFill>
+        <a:gradFill rotWithShape="1">
+          <a:gsLst>
+            <a:gs pos="0">
+              <a:schemeClr val="phClr">
+                <a:tint val="50000"/>
+                <a:satMod val="300000"/>
+              </a:schemeClr>
+            </a:gs>
+            <a:gs pos="35000">
+              <a:schemeClr val="phClr">
+                <a:tint val="37000"/>
+                <a:satMod val="300000"/>
+              </a:schemeClr>
+            </a:gs>
+            <a:gs pos="100000">
+              <a:schemeClr val="phClr">
+                <a:tint val="15000"/>
+                <a:satMod val="350000"/>
+              </a:schemeClr>
+            </a:gs>
+          </a:gsLst>
+          <a:lin ang="16200000" scaled="1"/>
+        </a:gradFill>
+        <a:gradFill rotWithShape="1">
+          <a:gsLst>
+            <a:gs pos="0">
+              <a:schemeClr val="phClr">
+                <a:shade val="51000"/>
+                <a:satMod val="130000"/>
+              </a:schemeClr>
+            </a:gs>
+            <a:gs pos="80000">
+              <a:schemeClr val="phClr">
+                <a:shade val="93000"/>
+                <a:satMod val="130000"/>
+              </a:schemeClr>
+            </a:gs>
+            <a:gs pos="100000">
+              <a:schemeClr val="phClr">
+                <a:shade val="94000"/>
+                <a:satMod val="135000"/>
+              </a:schemeClr>
+            </a:gs>
+          </a:gsLst>
+          <a:lin ang="16200000" scaled="0"/>
+        </a:gradFill>
+      </a:fillStyleLst>
+      <a:lnStyleLst>
+        <a:ln w="9525" cap="flat" cmpd="sng" algn="ctr">
+          <a:solidFill>
+            <a:schemeClr val="phClr">
+              <a:shade val="95000"/>
+              <a:satMod val="105000"/>
+            </a:schemeClr>
+          </a:solidFill>
+          <a:prstDash val="solid"/>
+        </a:ln>
+        <a:ln w="25400" cap="flat" cmpd="sng" algn="ctr">
+          <a:solidFill>
+            <a:schemeClr val="phClr"/>
+          </a:solidFill>
+          <a:prstDash val="solid"/>
+        </a:ln>
+        <a:ln w="38100" cap="flat" cmpd="sng" algn="ctr">
+          <a:solidFill>
+            <a:schemeClr val="phClr"/>
+          </a:solidFill>
+          <a:prstDash val="solid"/>
+        </a:ln>
+      </a:lnStyleLst>
+      <a:effectStyleLst>
+        <a:effectStyle>
+          <a:effectLst>
+            <a:outerShdw blurRad="40000" dist="20000" dir="5400000" rotWithShape="0">
+              <a:srgbClr val="000000">
+                <a:alpha val="38000"/>
+              </a:srgbClr>
+            </a:outerShdw>
+          </a:effectLst>
+        </a:effectStyle>
+        <a:effectStyle>
+          <a:effectLst>
+            <a:outerShdw blurRad="40000" dist="23000" dir="5400000" rotWithShape="0">
+              <a:srgbClr val="000000">
+                <a:alpha val="35000"/>
+              </a:srgbClr>
+            </a:outerShdw>
+          </a:effectLst>
+        </a:effectStyle>
+        <a:effectStyle>
+          <a:effectLst>
+            <a:outerShdw blurRad="40000" dist="23000" dir="5400000" rotWithShape="0">
+              <a:srgbClr val="000000">
+                <a:alpha val="35000"/>
+              </a:srgbClr>
+            </a:outerShdw>
+          </a:effectLst>
+          <a:scene3d>
+            <a:camera prst="orthographicFront">
+              <a:rot lat="0" lon="0" rev="0"/>
+            </a:camera>
+            <a:lightRig rig="threePt" dir="t">
+              <a:rot lat="0" lon="0" rev="1200000"/>
+            </a:lightRig>
+          </a:scene3d>
+          <a:sp3d>
+            <a:bevelT w="63500" h="25400"/>
+          </a:sp3d>
+        </a:effectStyle>
+      </a:effectStyleLst>
+      <a:bgFillStyleLst>
+        <a:solidFill>
+          <a:schemeClr val="phClr"/>
+        </a:solidFill>
+        <a:gradFill rotWithShape="1">
+          <a:gsLst>
+            <a:gs pos="0">
+              <a:schemeClr val="phClr">
+                <a:tint val="40000"/>
+                <a:satMod val="350000"/>
+              </a:schemeClr>
+            </a:gs>
+            <a:gs pos="40000">
+              <a:schemeClr val="phClr">
+                <a:tint val="45000"/>
+                <a:shade val="99000"/>
+                <a:satMod val="350000"/>
+              </a:schemeClr>
+            </a:gs>
+            <a:gs pos="100000">
+              <a:schemeClr val="phClr">
+                <a:shade val="20000"/>
+                <a:satMod val="255000"/>
+              </a:schemeClr>
+            </a:gs>
+          </a:gsLst>
+          <a:path path="circle">
+            <a:fillToRect l="50000" t="-80000" r="50000" b="180000"/>
+          </a:path>
+        </a:gradFill>
+        <a:gradFill rotWithShape="1">
+          <a:gsLst>
+            <a:gs pos="0">
+              <a:schemeClr val="phClr">
+                <a:tint val="80000"/>
+                <a:satMod val="300000"/>
+              </a:schemeClr>
+            </a:gs>
+            <a:gs pos="100000">
+              <a:schemeClr val="phClr">
+                <a:shade val="30000"/>
+                <a:satMod val="200000"/>
+              </a:schemeClr>
+            </a:gs>
+          </a:gsLst>
+          <a:path path="circle">
+            <a:fillToRect l="50000" t="50000" r="50000" b="50000"/>
+          </a:path>
+        </a:gradFill>
+      </a:bgFillStyleLst>
+    </a:fmtScheme>
+  </a:themeElements>
+  <a:objectDefaults/>
+  <a:extraClrSchemeLst/>
+</a:theme>
+</file>
+
+<file path=ppt/theme/themeOverride1.xml><?xml version="1.0" encoding="utf-8"?>
+<a:themeOverride xmlns:a="http://schemas.openxmlformats.org/drawingml/2006/main">
+  <a:clrScheme name="Essential">
+    <a:dk1>
+      <a:srgbClr val="000000"/>
+    </a:dk1>
+    <a:lt1>
+      <a:srgbClr val="FFFFFF"/>
+    </a:lt1>
+    <a:dk2>
+      <a:srgbClr val="D1282E"/>
+    </a:dk2>
+    <a:lt2>
+      <a:srgbClr val="C8C8B1"/>
+    </a:lt2>
+    <a:accent1>
+      <a:srgbClr val="7A7A7A"/>
+    </a:accent1>
+    <a:accent2>
+      <a:srgbClr val="F5C201"/>
+    </a:accent2>
+    <a:accent3>
+      <a:srgbClr val="526DB0"/>
+    </a:accent3>
+    <a:accent4>
+      <a:srgbClr val="989AAC"/>
+    </a:accent4>
+    <a:accent5>
+      <a:srgbClr val="DC5924"/>
+    </a:accent5>
+    <a:accent6>
+      <a:srgbClr val="B4B392"/>
+    </a:accent6>
+    <a:hlink>
+      <a:srgbClr val="CC9900"/>
+    </a:hlink>
+    <a:folHlink>
+      <a:srgbClr val="969696"/>
+    </a:folHlink>
+  </a:clrScheme>
+</a:themeOverride>
 </file>
</xml_diff>

<commit_message>
Updated cap 1 ppt
</commit_message>
<xml_diff>
--- a/Churn_Analysis/Churn_Analysis_Presentation.pptx
+++ b/Churn_Analysis/Churn_Analysis_Presentation.pptx
@@ -2975,14 +2975,12 @@
   <p:cSld>
     <p:bg>
       <p:bgPr>
-        <a:pattFill prst="pct5">
-          <a:fgClr>
-            <a:schemeClr val="bg2"/>
-          </a:fgClr>
-          <a:bgClr>
-            <a:schemeClr val="bg1"/>
-          </a:bgClr>
-        </a:pattFill>
+        <a:solidFill>
+          <a:schemeClr val="bg1">
+            <a:lumMod val="95000"/>
+            <a:alpha val="20000"/>
+          </a:schemeClr>
+        </a:solidFill>
         <a:effectLst/>
       </p:bgPr>
     </p:bg>
@@ -3552,17 +3550,7 @@
                   </a:schemeClr>
                 </a:solidFill>
               </a:rPr>
-              <a:t>he Churn Of </a:t>
-            </a:r>
-            <a:r>
-              <a:rPr lang="en-IN" sz="4000" dirty="0" smtClean="0">
-                <a:solidFill>
-                  <a:schemeClr val="accent6">
-                    <a:lumMod val="75000"/>
-                  </a:schemeClr>
-                </a:solidFill>
-              </a:rPr>
-              <a:t>Bank Customers</a:t>
+              <a:t>he Churn Of Bank Customers</a:t>
             </a:r>
             <a:endParaRPr lang="en-IN" sz="4000" dirty="0">
               <a:solidFill>
@@ -6411,13 +6399,6 @@
               </a:rPr>
               <a:t>prediction variables</a:t>
             </a:r>
-            <a:endParaRPr lang="en-IN" dirty="0">
-              <a:solidFill>
-                <a:schemeClr val="accent6">
-                  <a:lumMod val="75000"/>
-                </a:schemeClr>
-              </a:solidFill>
-            </a:endParaRPr>
           </a:p>
         </p:txBody>
       </p:sp>

</xml_diff>